<commit_message>
Updated PP and Class Diagram
Added Class diagrams, burndown chart, & agile section to .ppt
</commit_message>
<xml_diff>
--- a/resources/PowerPoints/Product Release.pptx
+++ b/resources/PowerPoints/Product Release.pptx
@@ -5,29 +5,35 @@
     <p:sldMasterId id="2147483648" r:id="rId1"/>
   </p:sldMasterIdLst>
   <p:notesMasterIdLst>
-    <p:notesMasterId r:id="rId19"/>
+    <p:notesMasterId r:id="rId25"/>
   </p:notesMasterIdLst>
   <p:handoutMasterIdLst>
-    <p:handoutMasterId r:id="rId20"/>
+    <p:handoutMasterId r:id="rId26"/>
   </p:handoutMasterIdLst>
   <p:sldIdLst>
-    <p:sldId id="277" r:id="rId2"/>
-    <p:sldId id="278" r:id="rId3"/>
-    <p:sldId id="282" r:id="rId4"/>
-    <p:sldId id="285" r:id="rId5"/>
-    <p:sldId id="280" r:id="rId6"/>
-    <p:sldId id="294" r:id="rId7"/>
-    <p:sldId id="286" r:id="rId8"/>
-    <p:sldId id="287" r:id="rId9"/>
-    <p:sldId id="288" r:id="rId10"/>
-    <p:sldId id="289" r:id="rId11"/>
-    <p:sldId id="290" r:id="rId12"/>
-    <p:sldId id="291" r:id="rId13"/>
-    <p:sldId id="292" r:id="rId14"/>
-    <p:sldId id="293" r:id="rId15"/>
-    <p:sldId id="283" r:id="rId16"/>
-    <p:sldId id="284" r:id="rId17"/>
-    <p:sldId id="274" r:id="rId18"/>
+    <p:sldId id="256" r:id="rId2"/>
+    <p:sldId id="257" r:id="rId3"/>
+    <p:sldId id="258" r:id="rId4"/>
+    <p:sldId id="259" r:id="rId5"/>
+    <p:sldId id="260" r:id="rId6"/>
+    <p:sldId id="261" r:id="rId7"/>
+    <p:sldId id="262" r:id="rId8"/>
+    <p:sldId id="263" r:id="rId9"/>
+    <p:sldId id="264" r:id="rId10"/>
+    <p:sldId id="265" r:id="rId11"/>
+    <p:sldId id="266" r:id="rId12"/>
+    <p:sldId id="267" r:id="rId13"/>
+    <p:sldId id="268" r:id="rId14"/>
+    <p:sldId id="269" r:id="rId15"/>
+    <p:sldId id="270" r:id="rId16"/>
+    <p:sldId id="271" r:id="rId17"/>
+    <p:sldId id="272" r:id="rId18"/>
+    <p:sldId id="273" r:id="rId19"/>
+    <p:sldId id="274" r:id="rId20"/>
+    <p:sldId id="275" r:id="rId21"/>
+    <p:sldId id="276" r:id="rId22"/>
+    <p:sldId id="277" r:id="rId23"/>
+    <p:sldId id="278" r:id="rId24"/>
   </p:sldIdLst>
   <p:sldSz cx="9144000" cy="6858000" type="screen4x3"/>
   <p:notesSz cx="6858000" cy="9144000"/>
@@ -128,7 +134,7 @@
   </p:defaultTextStyle>
   <p:extLst>
     <p:ext uri="{EFAFB233-063F-42B5-8137-9DF3F51BA10A}">
-      <p15:sldGuideLst xmlns:p15="http://schemas.microsoft.com/office/powerpoint/2012/main" xmlns="">
+      <p15:sldGuideLst xmlns:p15="http://schemas.microsoft.com/office/powerpoint/2012/main">
         <p15:guide id="1" orient="horz" pos="2160">
           <p15:clr>
             <a:srgbClr val="A4A3A4"/>
@@ -142,7 +148,7 @@
       </p15:sldGuideLst>
     </p:ext>
     <p:ext uri="{2D200454-40CA-4A62-9FC3-DE9A4176ACB9}">
-      <p15:notesGuideLst xmlns:p15="http://schemas.microsoft.com/office/powerpoint/2012/main" xmlns="">
+      <p15:notesGuideLst xmlns:p15="http://schemas.microsoft.com/office/powerpoint/2012/main">
         <p15:guide id="1" orient="horz" pos="2880">
           <p15:clr>
             <a:srgbClr val="A4A3A4"/>
@@ -157,6 +163,469 @@
     </p:ext>
   </p:extLst>
 </p:presentation>
+</file>
+
+<file path=ppt/charts/chart1.xml><?xml version="1.0" encoding="utf-8"?>
+<c:chartSpace xmlns:c="http://schemas.openxmlformats.org/drawingml/2006/chart" xmlns:a="http://schemas.openxmlformats.org/drawingml/2006/main" xmlns:r="http://schemas.openxmlformats.org/officeDocument/2006/relationships">
+  <c:date1904 val="0"/>
+  <c:lang val="en-US"/>
+  <c:roundedCorners val="0"/>
+  <mc:AlternateContent xmlns:mc="http://schemas.openxmlformats.org/markup-compatibility/2006">
+    <mc:Choice xmlns:c14="http://schemas.microsoft.com/office/drawing/2007/8/2/chart" Requires="c14">
+      <c14:style val="118"/>
+    </mc:Choice>
+    <mc:Fallback>
+      <c:style val="18"/>
+    </mc:Fallback>
+  </mc:AlternateContent>
+  <c:chart>
+    <c:title>
+      <c:tx>
+        <c:rich>
+          <a:bodyPr/>
+          <a:lstStyle/>
+          <a:p>
+            <a:pPr>
+              <a:defRPr/>
+            </a:pPr>
+            <a:r>
+              <a:rPr lang="en-US"/>
+              <a:t>Burn Down Chart</a:t>
+            </a:r>
+          </a:p>
+        </c:rich>
+      </c:tx>
+      <c:overlay val="0"/>
+    </c:title>
+    <c:autoTitleDeleted val="0"/>
+    <c:plotArea>
+      <c:layout/>
+      <c:lineChart>
+        <c:grouping val="standard"/>
+        <c:varyColors val="0"/>
+        <c:ser>
+          <c:idx val="0"/>
+          <c:order val="0"/>
+          <c:tx>
+            <c:v>Actual Story Points Remaining</c:v>
+          </c:tx>
+          <c:marker>
+            <c:symbol val="none"/>
+          </c:marker>
+          <c:trendline>
+            <c:name>Idea Story Points Remaining</c:name>
+            <c:trendlineType val="poly"/>
+            <c:order val="2"/>
+            <c:dispRSqr val="0"/>
+            <c:dispEq val="0"/>
+          </c:trendline>
+          <c:cat>
+            <c:strRef>
+              <c:f>Sheet2!$A$1:$AT$1</c:f>
+              <c:strCache>
+                <c:ptCount val="46"/>
+                <c:pt idx="0">
+                  <c:v>Sprint 1</c:v>
+                </c:pt>
+                <c:pt idx="1">
+                  <c:v>Day 2</c:v>
+                </c:pt>
+                <c:pt idx="2">
+                  <c:v>Day 3</c:v>
+                </c:pt>
+                <c:pt idx="3">
+                  <c:v>Day 4</c:v>
+                </c:pt>
+                <c:pt idx="4">
+                  <c:v>Day 5</c:v>
+                </c:pt>
+                <c:pt idx="5">
+                  <c:v>Day 6</c:v>
+                </c:pt>
+                <c:pt idx="6">
+                  <c:v>Day 7</c:v>
+                </c:pt>
+                <c:pt idx="7">
+                  <c:v>Day 8</c:v>
+                </c:pt>
+                <c:pt idx="8">
+                  <c:v>Day 9</c:v>
+                </c:pt>
+                <c:pt idx="9">
+                  <c:v> Day 10</c:v>
+                </c:pt>
+                <c:pt idx="10">
+                  <c:v>Sprint 2</c:v>
+                </c:pt>
+                <c:pt idx="11">
+                  <c:v>Day 2</c:v>
+                </c:pt>
+                <c:pt idx="12">
+                  <c:v>Day 3</c:v>
+                </c:pt>
+                <c:pt idx="13">
+                  <c:v>Day 4</c:v>
+                </c:pt>
+                <c:pt idx="14">
+                  <c:v>Day 5</c:v>
+                </c:pt>
+                <c:pt idx="15">
+                  <c:v>Day 6</c:v>
+                </c:pt>
+                <c:pt idx="16">
+                  <c:v>Day 7</c:v>
+                </c:pt>
+                <c:pt idx="17">
+                  <c:v>Day 8 </c:v>
+                </c:pt>
+                <c:pt idx="18">
+                  <c:v>Day 9</c:v>
+                </c:pt>
+                <c:pt idx="19">
+                  <c:v>Day 10</c:v>
+                </c:pt>
+                <c:pt idx="20">
+                  <c:v>Sprint 3</c:v>
+                </c:pt>
+                <c:pt idx="21">
+                  <c:v>Day 2</c:v>
+                </c:pt>
+                <c:pt idx="22">
+                  <c:v>Day 3</c:v>
+                </c:pt>
+                <c:pt idx="23">
+                  <c:v>Day 4</c:v>
+                </c:pt>
+                <c:pt idx="24">
+                  <c:v>Day 5</c:v>
+                </c:pt>
+                <c:pt idx="25">
+                  <c:v>Day 6</c:v>
+                </c:pt>
+                <c:pt idx="26">
+                  <c:v>Day 7</c:v>
+                </c:pt>
+                <c:pt idx="27">
+                  <c:v>Day 8 </c:v>
+                </c:pt>
+                <c:pt idx="28">
+                  <c:v>Day 9</c:v>
+                </c:pt>
+                <c:pt idx="29">
+                  <c:v>Day 10</c:v>
+                </c:pt>
+                <c:pt idx="30">
+                  <c:v>Sprint 4</c:v>
+                </c:pt>
+                <c:pt idx="31">
+                  <c:v>Day 2</c:v>
+                </c:pt>
+                <c:pt idx="32">
+                  <c:v>Day 3</c:v>
+                </c:pt>
+                <c:pt idx="33">
+                  <c:v>Day 4</c:v>
+                </c:pt>
+                <c:pt idx="34">
+                  <c:v>Day 5</c:v>
+                </c:pt>
+                <c:pt idx="35">
+                  <c:v>Day 6</c:v>
+                </c:pt>
+                <c:pt idx="36">
+                  <c:v>Day 7</c:v>
+                </c:pt>
+                <c:pt idx="37">
+                  <c:v>Day 8</c:v>
+                </c:pt>
+                <c:pt idx="38">
+                  <c:v>Day 9</c:v>
+                </c:pt>
+                <c:pt idx="39">
+                  <c:v>Day 10</c:v>
+                </c:pt>
+                <c:pt idx="40">
+                  <c:v>Sprint 5</c:v>
+                </c:pt>
+                <c:pt idx="41">
+                  <c:v>Day 2</c:v>
+                </c:pt>
+                <c:pt idx="42">
+                  <c:v>Day 3</c:v>
+                </c:pt>
+                <c:pt idx="43">
+                  <c:v>Day 4</c:v>
+                </c:pt>
+                <c:pt idx="44">
+                  <c:v>Day 5</c:v>
+                </c:pt>
+                <c:pt idx="45">
+                  <c:v>Day 6</c:v>
+                </c:pt>
+              </c:strCache>
+            </c:strRef>
+          </c:cat>
+          <c:val>
+            <c:numRef>
+              <c:f>Sheet2!$A$2:$AT$2</c:f>
+              <c:numCache>
+                <c:formatCode>General</c:formatCode>
+                <c:ptCount val="46"/>
+                <c:pt idx="0">
+                  <c:v>78</c:v>
+                </c:pt>
+                <c:pt idx="1">
+                  <c:v>78</c:v>
+                </c:pt>
+                <c:pt idx="2">
+                  <c:v>78</c:v>
+                </c:pt>
+                <c:pt idx="3">
+                  <c:v>78</c:v>
+                </c:pt>
+                <c:pt idx="4">
+                  <c:v>78</c:v>
+                </c:pt>
+                <c:pt idx="5">
+                  <c:v>73</c:v>
+                </c:pt>
+                <c:pt idx="6">
+                  <c:v>68</c:v>
+                </c:pt>
+                <c:pt idx="7">
+                  <c:v>68</c:v>
+                </c:pt>
+                <c:pt idx="8">
+                  <c:v>68</c:v>
+                </c:pt>
+                <c:pt idx="9">
+                  <c:v>68</c:v>
+                </c:pt>
+                <c:pt idx="10">
+                  <c:v>68</c:v>
+                </c:pt>
+                <c:pt idx="11">
+                  <c:v>68</c:v>
+                </c:pt>
+                <c:pt idx="12">
+                  <c:v>68</c:v>
+                </c:pt>
+                <c:pt idx="13">
+                  <c:v>65</c:v>
+                </c:pt>
+                <c:pt idx="14">
+                  <c:v>62</c:v>
+                </c:pt>
+                <c:pt idx="15">
+                  <c:v>62</c:v>
+                </c:pt>
+                <c:pt idx="16">
+                  <c:v>60</c:v>
+                </c:pt>
+                <c:pt idx="17">
+                  <c:v>60</c:v>
+                </c:pt>
+                <c:pt idx="18">
+                  <c:v>60</c:v>
+                </c:pt>
+                <c:pt idx="19">
+                  <c:v>52</c:v>
+                </c:pt>
+                <c:pt idx="20">
+                  <c:v>52</c:v>
+                </c:pt>
+                <c:pt idx="21">
+                  <c:v>52</c:v>
+                </c:pt>
+                <c:pt idx="22">
+                  <c:v>52</c:v>
+                </c:pt>
+                <c:pt idx="23">
+                  <c:v>52</c:v>
+                </c:pt>
+                <c:pt idx="24">
+                  <c:v>52</c:v>
+                </c:pt>
+                <c:pt idx="25">
+                  <c:v>52</c:v>
+                </c:pt>
+                <c:pt idx="26">
+                  <c:v>52</c:v>
+                </c:pt>
+                <c:pt idx="27">
+                  <c:v>52</c:v>
+                </c:pt>
+                <c:pt idx="28">
+                  <c:v>33</c:v>
+                </c:pt>
+                <c:pt idx="29">
+                  <c:v>33</c:v>
+                </c:pt>
+                <c:pt idx="30">
+                  <c:v>33</c:v>
+                </c:pt>
+                <c:pt idx="31">
+                  <c:v>33</c:v>
+                </c:pt>
+                <c:pt idx="32">
+                  <c:v>33</c:v>
+                </c:pt>
+                <c:pt idx="33">
+                  <c:v>33</c:v>
+                </c:pt>
+                <c:pt idx="34">
+                  <c:v>33</c:v>
+                </c:pt>
+                <c:pt idx="35">
+                  <c:v>23</c:v>
+                </c:pt>
+                <c:pt idx="36">
+                  <c:v>23</c:v>
+                </c:pt>
+                <c:pt idx="37">
+                  <c:v>23</c:v>
+                </c:pt>
+                <c:pt idx="38">
+                  <c:v>20</c:v>
+                </c:pt>
+                <c:pt idx="39">
+                  <c:v>15</c:v>
+                </c:pt>
+                <c:pt idx="40">
+                  <c:v>15</c:v>
+                </c:pt>
+                <c:pt idx="41">
+                  <c:v>15</c:v>
+                </c:pt>
+                <c:pt idx="42">
+                  <c:v>15</c:v>
+                </c:pt>
+                <c:pt idx="43">
+                  <c:v>15</c:v>
+                </c:pt>
+                <c:pt idx="44">
+                  <c:v>10</c:v>
+                </c:pt>
+                <c:pt idx="45">
+                  <c:v>0</c:v>
+                </c:pt>
+              </c:numCache>
+            </c:numRef>
+          </c:val>
+          <c:smooth val="0"/>
+        </c:ser>
+        <c:dLbls>
+          <c:showLegendKey val="0"/>
+          <c:showVal val="0"/>
+          <c:showCatName val="0"/>
+          <c:showSerName val="0"/>
+          <c:showPercent val="0"/>
+          <c:showBubbleSize val="0"/>
+        </c:dLbls>
+        <c:smooth val="0"/>
+        <c:axId val="46312944"/>
+        <c:axId val="46315184"/>
+      </c:lineChart>
+      <c:catAx>
+        <c:axId val="46312944"/>
+        <c:scaling>
+          <c:orientation val="minMax"/>
+        </c:scaling>
+        <c:delete val="0"/>
+        <c:axPos val="b"/>
+        <c:title>
+          <c:tx>
+            <c:rich>
+              <a:bodyPr/>
+              <a:lstStyle/>
+              <a:p>
+                <a:pPr>
+                  <a:defRPr/>
+                </a:pPr>
+                <a:r>
+                  <a:rPr lang="en-US"/>
+                  <a:t>Days</a:t>
+                </a:r>
+                <a:r>
+                  <a:rPr lang="en-US" baseline="0"/>
+                  <a:t> Within Sprint</a:t>
+                </a:r>
+              </a:p>
+            </c:rich>
+          </c:tx>
+          <c:overlay val="0"/>
+        </c:title>
+        <c:numFmt formatCode="General" sourceLinked="0"/>
+        <c:majorTickMark val="out"/>
+        <c:minorTickMark val="none"/>
+        <c:tickLblPos val="nextTo"/>
+        <c:crossAx val="46315184"/>
+        <c:crosses val="autoZero"/>
+        <c:auto val="1"/>
+        <c:lblAlgn val="ctr"/>
+        <c:lblOffset val="100"/>
+        <c:noMultiLvlLbl val="0"/>
+      </c:catAx>
+      <c:valAx>
+        <c:axId val="46315184"/>
+        <c:scaling>
+          <c:orientation val="minMax"/>
+        </c:scaling>
+        <c:delete val="0"/>
+        <c:axPos val="l"/>
+        <c:majorGridlines/>
+        <c:title>
+          <c:tx>
+            <c:rich>
+              <a:bodyPr rot="0" vert="wordArtVert"/>
+              <a:lstStyle/>
+              <a:p>
+                <a:pPr>
+                  <a:defRPr/>
+                </a:pPr>
+                <a:r>
+                  <a:rPr lang="en-US"/>
+                  <a:t>Story</a:t>
+                </a:r>
+                <a:r>
+                  <a:rPr lang="en-US" baseline="0"/>
+                  <a:t> Points</a:t>
+                </a:r>
+                <a:endParaRPr lang="en-US"/>
+              </a:p>
+            </c:rich>
+          </c:tx>
+          <c:layout>
+            <c:manualLayout>
+              <c:xMode val="edge"/>
+              <c:yMode val="edge"/>
+              <c:x val="5.2562417871222103E-3"/>
+              <c:y val="0.35799595658650801"/>
+            </c:manualLayout>
+          </c:layout>
+          <c:overlay val="0"/>
+        </c:title>
+        <c:numFmt formatCode="General" sourceLinked="1"/>
+        <c:majorTickMark val="out"/>
+        <c:minorTickMark val="none"/>
+        <c:tickLblPos val="nextTo"/>
+        <c:crossAx val="46312944"/>
+        <c:crosses val="autoZero"/>
+        <c:crossBetween val="between"/>
+      </c:valAx>
+    </c:plotArea>
+    <c:legend>
+      <c:legendPos val="r"/>
+      <c:overlay val="0"/>
+    </c:legend>
+    <c:plotVisOnly val="1"/>
+    <c:dispBlanksAs val="gap"/>
+    <c:showDLblsOverMax val="0"/>
+  </c:chart>
+  <c:externalData r:id="rId1">
+    <c:autoUpdate val="0"/>
+  </c:externalData>
+</c:chartSpace>
 </file>
 
 <file path=ppt/handoutMasters/handoutMaster1.xml><?xml version="1.0" encoding="utf-8"?>
@@ -242,7 +711,7 @@
             <a:fld id="{0264D8D3-2931-44A9-B334-5BFA9548357C}" type="datetimeFigureOut">
               <a:rPr lang="en-US" smtClean="0"/>
               <a:pPr/>
-              <a:t>4/14/2015</a:t>
+              <a:t>Apr-15-15</a:t>
             </a:fld>
             <a:endParaRPr lang="en-US"/>
           </a:p>
@@ -318,7 +787,7 @@
     </p:spTree>
     <p:extLst>
       <p:ext uri="{BB962C8B-B14F-4D97-AF65-F5344CB8AC3E}">
-        <p14:creationId xmlns:p14="http://schemas.microsoft.com/office/powerpoint/2010/main" xmlns="" val="395052657"/>
+        <p14:creationId xmlns:p14="http://schemas.microsoft.com/office/powerpoint/2010/main" val="395052657"/>
       </p:ext>
     </p:extLst>
   </p:cSld>
@@ -409,7 +878,7 @@
             <a:fld id="{0D52FC71-4605-44B8-B91E-E08CC08CE37E}" type="datetimeFigureOut">
               <a:rPr lang="en-US" smtClean="0"/>
               <a:pPr/>
-              <a:t>4/14/2015</a:t>
+              <a:t>Apr-15-15</a:t>
             </a:fld>
             <a:endParaRPr lang="en-US"/>
           </a:p>
@@ -580,7 +1049,7 @@
     </p:spTree>
     <p:extLst>
       <p:ext uri="{BB962C8B-B14F-4D97-AF65-F5344CB8AC3E}">
-        <p14:creationId xmlns:p14="http://schemas.microsoft.com/office/powerpoint/2010/main" xmlns="" val="291334106"/>
+        <p14:creationId xmlns:p14="http://schemas.microsoft.com/office/powerpoint/2010/main" val="291334106"/>
       </p:ext>
     </p:extLst>
   </p:cSld>
@@ -748,7 +1217,7 @@
             <a:fld id="{5FCE4A3C-90F1-4269-B571-96E475B950F2}" type="slidenum">
               <a:rPr lang="en-US" smtClean="0"/>
               <a:pPr/>
-              <a:t>17</a:t>
+              <a:t>23</a:t>
             </a:fld>
             <a:endParaRPr lang="en-US"/>
           </a:p>
@@ -757,7 +1226,7 @@
     </p:spTree>
     <p:extLst>
       <p:ext uri="{BB962C8B-B14F-4D97-AF65-F5344CB8AC3E}">
-        <p14:creationId xmlns:p14="http://schemas.microsoft.com/office/powerpoint/2010/main" xmlns="" val="1753582780"/>
+        <p14:creationId xmlns:p14="http://schemas.microsoft.com/office/powerpoint/2010/main" val="2830591300"/>
       </p:ext>
     </p:extLst>
   </p:cSld>
@@ -977,7 +1446,7 @@
             <a:fld id="{EDD6F47A-24E7-43E7-9208-1DEC7B32FB92}" type="datetime1">
               <a:rPr lang="en-US" smtClean="0"/>
               <a:pPr/>
-              <a:t>4/14/2015</a:t>
+              <a:t>Apr-15-15</a:t>
             </a:fld>
             <a:endParaRPr lang="en-US" dirty="0"/>
           </a:p>
@@ -1249,7 +1718,7 @@
             <a:fld id="{0E74CF96-A2C2-42EA-8707-6EDB896690DD}" type="datetime1">
               <a:rPr lang="en-US" smtClean="0"/>
               <a:pPr/>
-              <a:t>4/14/2015</a:t>
+              <a:t>Apr-15-15</a:t>
             </a:fld>
             <a:endParaRPr lang="en-US" dirty="0"/>
           </a:p>
@@ -1460,7 +1929,7 @@
             <a:fld id="{92D438F3-C605-4160-8B04-C6240AE9C337}" type="datetime1">
               <a:rPr lang="en-US" smtClean="0"/>
               <a:pPr/>
-              <a:t>4/14/2015</a:t>
+              <a:t>Apr-15-15</a:t>
             </a:fld>
             <a:endParaRPr lang="en-US" dirty="0"/>
           </a:p>
@@ -1663,7 +2132,7 @@
             <a:fld id="{8CCEB446-CAE2-4DDF-8603-C814EA3D1799}" type="datetime1">
               <a:rPr lang="en-US" smtClean="0"/>
               <a:pPr/>
-              <a:t>4/14/2015</a:t>
+              <a:t>Apr-15-15</a:t>
             </a:fld>
             <a:endParaRPr lang="en-US" dirty="0"/>
           </a:p>
@@ -1866,7 +2335,7 @@
             <a:fld id="{C7285E7B-D7D9-4B8B-837B-632B34D796E0}" type="datetime1">
               <a:rPr lang="en-US" smtClean="0"/>
               <a:pPr/>
-              <a:t>4/14/2015</a:t>
+              <a:t>Apr-15-15</a:t>
             </a:fld>
             <a:endParaRPr lang="en-US" dirty="0"/>
           </a:p>
@@ -2144,7 +2613,7 @@
             <a:fld id="{62BF2FED-CFA0-4C9E-B3D8-54D6C9F3677E}" type="datetime1">
               <a:rPr lang="en-US" smtClean="0"/>
               <a:pPr/>
-              <a:t>4/14/2015</a:t>
+              <a:t>Apr-15-15</a:t>
             </a:fld>
             <a:endParaRPr lang="en-US" dirty="0"/>
           </a:p>
@@ -2437,7 +2906,7 @@
             <a:fld id="{973E0EB6-9529-4D7B-84B7-A5AA04321066}" type="datetime1">
               <a:rPr lang="en-US" smtClean="0"/>
               <a:pPr/>
-              <a:t>4/14/2015</a:t>
+              <a:t>Apr-15-15</a:t>
             </a:fld>
             <a:endParaRPr lang="en-US" dirty="0"/>
           </a:p>
@@ -2865,7 +3334,7 @@
             <a:fld id="{7E29DEC9-2AA5-43A0-9E2B-77A66E3482E2}" type="datetime1">
               <a:rPr lang="en-US" smtClean="0"/>
               <a:pPr/>
-              <a:t>4/14/2015</a:t>
+              <a:t>Apr-15-15</a:t>
             </a:fld>
             <a:endParaRPr lang="en-US" dirty="0"/>
           </a:p>
@@ -3320,7 +3789,7 @@
             <a:fld id="{3B41F5DB-043C-4249-8492-541621BB7C9B}" type="datetime1">
               <a:rPr lang="en-US" smtClean="0"/>
               <a:pPr/>
-              <a:t>4/14/2015</a:t>
+              <a:t>Apr-15-15</a:t>
             </a:fld>
             <a:endParaRPr lang="en-US" dirty="0"/>
           </a:p>
@@ -3479,7 +3948,7 @@
             <a:fld id="{3FC9A497-93CF-43C1-805C-73F5A8554AFC}" type="datetime1">
               <a:rPr lang="en-US" smtClean="0"/>
               <a:pPr/>
-              <a:t>4/14/2015</a:t>
+              <a:t>Apr-15-15</a:t>
             </a:fld>
             <a:endParaRPr lang="en-US" dirty="0"/>
           </a:p>
@@ -3615,7 +4084,7 @@
             <a:fld id="{4EB7A087-7565-48B4-A469-6A7119E3797E}" type="datetime1">
               <a:rPr lang="en-US" smtClean="0"/>
               <a:pPr/>
-              <a:t>4/14/2015</a:t>
+              <a:t>Apr-15-15</a:t>
             </a:fld>
             <a:endParaRPr lang="en-US" dirty="0"/>
           </a:p>
@@ -3933,7 +4402,7 @@
             <a:fld id="{20AF293B-D803-49EC-8CFA-49272D77DC19}" type="datetime1">
               <a:rPr lang="en-US" smtClean="0"/>
               <a:pPr/>
-              <a:t>4/14/2015</a:t>
+              <a:t>Apr-15-15</a:t>
             </a:fld>
             <a:endParaRPr lang="en-US" dirty="0"/>
           </a:p>
@@ -4253,7 +4722,7 @@
             <a:fld id="{D49FA766-B207-4F4C-9CE3-80B0488B4608}" type="datetime1">
               <a:rPr lang="en-US" smtClean="0"/>
               <a:pPr/>
-              <a:t>4/14/2015</a:t>
+              <a:t>Apr-15-15</a:t>
             </a:fld>
             <a:endParaRPr lang="en-US" dirty="0"/>
           </a:p>
@@ -5288,6 +5757,11 @@
         </p:txBody>
       </p:sp>
     </p:spTree>
+    <p:extLst>
+      <p:ext uri="{BB962C8B-B14F-4D97-AF65-F5344CB8AC3E}">
+        <p14:creationId xmlns:p14="http://schemas.microsoft.com/office/powerpoint/2010/main" val="897743619"/>
+      </p:ext>
+    </p:extLst>
   </p:cSld>
   <p:clrMapOvr>
     <a:masterClrMapping/>
@@ -5338,6 +5812,715 @@
           <a:lstStyle/>
           <a:p>
             <a:r>
+              <a:rPr lang="en-US" dirty="0"/>
+              <a:t>Class Diagram (Part </a:t>
+            </a:r>
+            <a:r>
+              <a:rPr lang="en-US" dirty="0" smtClean="0"/>
+              <a:t>C)</a:t>
+            </a:r>
+            <a:endParaRPr lang="en-US" dirty="0"/>
+          </a:p>
+        </p:txBody>
+      </p:sp>
+      <p:sp>
+        <p:nvSpPr>
+          <p:cNvPr id="4" name="Slide Number Placeholder 3"/>
+          <p:cNvSpPr>
+            <a:spLocks noGrp="1"/>
+          </p:cNvSpPr>
+          <p:nvPr>
+            <p:ph type="sldNum" sz="quarter" idx="11"/>
+          </p:nvPr>
+        </p:nvSpPr>
+        <p:spPr/>
+        <p:txBody>
+          <a:bodyPr/>
+          <a:lstStyle/>
+          <a:p>
+            <a:fld id="{92CE3AC1-C231-4266-B594-3ACF466A7833}" type="slidenum">
+              <a:rPr lang="en-US" smtClean="0"/>
+              <a:pPr/>
+              <a:t>10</a:t>
+            </a:fld>
+            <a:endParaRPr lang="en-US" dirty="0"/>
+          </a:p>
+        </p:txBody>
+      </p:sp>
+      <p:sp>
+        <p:nvSpPr>
+          <p:cNvPr id="5" name="Footer Placeholder 4"/>
+          <p:cNvSpPr>
+            <a:spLocks noGrp="1"/>
+          </p:cNvSpPr>
+          <p:nvPr>
+            <p:ph type="ftr" sz="quarter" idx="12"/>
+          </p:nvPr>
+        </p:nvSpPr>
+        <p:spPr/>
+        <p:txBody>
+          <a:bodyPr/>
+          <a:lstStyle/>
+          <a:p>
+            <a:endParaRPr lang="en-US" dirty="0"/>
+          </a:p>
+        </p:txBody>
+      </p:sp>
+      <p:pic>
+        <p:nvPicPr>
+          <p:cNvPr id="9" name="Content Placeholder 8"/>
+          <p:cNvPicPr>
+            <a:picLocks noGrp="1" noChangeAspect="1"/>
+          </p:cNvPicPr>
+          <p:nvPr>
+            <p:ph idx="1"/>
+          </p:nvPr>
+        </p:nvPicPr>
+        <p:blipFill rotWithShape="1">
+          <a:blip r:embed="rId2" cstate="print">
+            <a:extLst>
+              <a:ext uri="{28A0092B-C50C-407E-A947-70E740481C1C}">
+                <a14:useLocalDpi xmlns:a14="http://schemas.microsoft.com/office/drawing/2010/main" val="0"/>
+              </a:ext>
+            </a:extLst>
+          </a:blip>
+          <a:srcRect l="72222" t="-1" b="48519"/>
+          <a:stretch/>
+        </p:blipFill>
+        <p:spPr>
+          <a:xfrm>
+            <a:off x="2272292" y="1836114"/>
+            <a:ext cx="4433308" cy="4520236"/>
+          </a:xfrm>
+        </p:spPr>
+      </p:pic>
+    </p:spTree>
+    <p:extLst>
+      <p:ext uri="{BB962C8B-B14F-4D97-AF65-F5344CB8AC3E}">
+        <p14:creationId xmlns:p14="http://schemas.microsoft.com/office/powerpoint/2010/main" val="4168484982"/>
+      </p:ext>
+    </p:extLst>
+  </p:cSld>
+  <p:clrMapOvr>
+    <a:masterClrMapping/>
+  </p:clrMapOvr>
+  <p:transition>
+    <p:fade thruBlk="1"/>
+  </p:transition>
+  <p:timing>
+    <p:tnLst>
+      <p:par>
+        <p:cTn id="1" dur="indefinite" restart="never" nodeType="tmRoot"/>
+      </p:par>
+    </p:tnLst>
+  </p:timing>
+</p:sld>
+</file>
+
+<file path=ppt/slides/slide11.xml><?xml version="1.0" encoding="utf-8"?>
+<p:sld xmlns:a="http://schemas.openxmlformats.org/drawingml/2006/main" xmlns:r="http://schemas.openxmlformats.org/officeDocument/2006/relationships" xmlns:p="http://schemas.openxmlformats.org/presentationml/2006/main">
+  <p:cSld>
+    <p:spTree>
+      <p:nvGrpSpPr>
+        <p:cNvPr id="1" name=""/>
+        <p:cNvGrpSpPr/>
+        <p:nvPr/>
+      </p:nvGrpSpPr>
+      <p:grpSpPr>
+        <a:xfrm>
+          <a:off x="0" y="0"/>
+          <a:ext cx="0" cy="0"/>
+          <a:chOff x="0" y="0"/>
+          <a:chExt cx="0" cy="0"/>
+        </a:xfrm>
+      </p:grpSpPr>
+      <p:sp>
+        <p:nvSpPr>
+          <p:cNvPr id="2" name="Title 1"/>
+          <p:cNvSpPr>
+            <a:spLocks noGrp="1"/>
+          </p:cNvSpPr>
+          <p:nvPr>
+            <p:ph type="title"/>
+          </p:nvPr>
+        </p:nvSpPr>
+        <p:spPr/>
+        <p:txBody>
+          <a:bodyPr/>
+          <a:lstStyle/>
+          <a:p>
+            <a:r>
+              <a:rPr lang="en-US" dirty="0"/>
+              <a:t>Class Diagram (Part </a:t>
+            </a:r>
+            <a:r>
+              <a:rPr lang="en-US" dirty="0" smtClean="0"/>
+              <a:t>D)</a:t>
+            </a:r>
+            <a:endParaRPr lang="en-US" dirty="0"/>
+          </a:p>
+        </p:txBody>
+      </p:sp>
+      <p:sp>
+        <p:nvSpPr>
+          <p:cNvPr id="4" name="Slide Number Placeholder 3"/>
+          <p:cNvSpPr>
+            <a:spLocks noGrp="1"/>
+          </p:cNvSpPr>
+          <p:nvPr>
+            <p:ph type="sldNum" sz="quarter" idx="11"/>
+          </p:nvPr>
+        </p:nvSpPr>
+        <p:spPr/>
+        <p:txBody>
+          <a:bodyPr/>
+          <a:lstStyle/>
+          <a:p>
+            <a:fld id="{92CE3AC1-C231-4266-B594-3ACF466A7833}" type="slidenum">
+              <a:rPr lang="en-US" smtClean="0"/>
+              <a:pPr/>
+              <a:t>11</a:t>
+            </a:fld>
+            <a:endParaRPr lang="en-US" dirty="0"/>
+          </a:p>
+        </p:txBody>
+      </p:sp>
+      <p:sp>
+        <p:nvSpPr>
+          <p:cNvPr id="5" name="Footer Placeholder 4"/>
+          <p:cNvSpPr>
+            <a:spLocks noGrp="1"/>
+          </p:cNvSpPr>
+          <p:nvPr>
+            <p:ph type="ftr" sz="quarter" idx="12"/>
+          </p:nvPr>
+        </p:nvSpPr>
+        <p:spPr/>
+        <p:txBody>
+          <a:bodyPr/>
+          <a:lstStyle/>
+          <a:p>
+            <a:endParaRPr lang="en-US" dirty="0"/>
+          </a:p>
+        </p:txBody>
+      </p:sp>
+      <p:pic>
+        <p:nvPicPr>
+          <p:cNvPr id="9" name="Content Placeholder 8"/>
+          <p:cNvPicPr>
+            <a:picLocks noGrp="1" noChangeAspect="1"/>
+          </p:cNvPicPr>
+          <p:nvPr>
+            <p:ph idx="1"/>
+          </p:nvPr>
+        </p:nvPicPr>
+        <p:blipFill rotWithShape="1">
+          <a:blip r:embed="rId2" cstate="print">
+            <a:extLst>
+              <a:ext uri="{28A0092B-C50C-407E-A947-70E740481C1C}">
+                <a14:useLocalDpi xmlns:a14="http://schemas.microsoft.com/office/drawing/2010/main" val="0"/>
+              </a:ext>
+            </a:extLst>
+          </a:blip>
+          <a:srcRect l="67593" t="43759" r="14814" b="-982"/>
+          <a:stretch/>
+        </p:blipFill>
+        <p:spPr>
+          <a:xfrm>
+            <a:off x="3238500" y="1757975"/>
+            <a:ext cx="2667000" cy="4772526"/>
+          </a:xfrm>
+        </p:spPr>
+      </p:pic>
+    </p:spTree>
+    <p:extLst>
+      <p:ext uri="{BB962C8B-B14F-4D97-AF65-F5344CB8AC3E}">
+        <p14:creationId xmlns:p14="http://schemas.microsoft.com/office/powerpoint/2010/main" val="2749899540"/>
+      </p:ext>
+    </p:extLst>
+  </p:cSld>
+  <p:clrMapOvr>
+    <a:masterClrMapping/>
+  </p:clrMapOvr>
+  <p:transition>
+    <p:fade thruBlk="1"/>
+  </p:transition>
+  <p:timing>
+    <p:tnLst>
+      <p:par>
+        <p:cTn id="1" dur="indefinite" restart="never" nodeType="tmRoot"/>
+      </p:par>
+    </p:tnLst>
+  </p:timing>
+</p:sld>
+</file>
+
+<file path=ppt/slides/slide12.xml><?xml version="1.0" encoding="utf-8"?>
+<p:sld xmlns:a="http://schemas.openxmlformats.org/drawingml/2006/main" xmlns:r="http://schemas.openxmlformats.org/officeDocument/2006/relationships" xmlns:p="http://schemas.openxmlformats.org/presentationml/2006/main">
+  <p:cSld>
+    <p:spTree>
+      <p:nvGrpSpPr>
+        <p:cNvPr id="1" name=""/>
+        <p:cNvGrpSpPr/>
+        <p:nvPr/>
+      </p:nvGrpSpPr>
+      <p:grpSpPr>
+        <a:xfrm>
+          <a:off x="0" y="0"/>
+          <a:ext cx="0" cy="0"/>
+          <a:chOff x="0" y="0"/>
+          <a:chExt cx="0" cy="0"/>
+        </a:xfrm>
+      </p:grpSpPr>
+      <p:sp>
+        <p:nvSpPr>
+          <p:cNvPr id="2" name="Title 1"/>
+          <p:cNvSpPr>
+            <a:spLocks noGrp="1"/>
+          </p:cNvSpPr>
+          <p:nvPr>
+            <p:ph type="title"/>
+          </p:nvPr>
+        </p:nvSpPr>
+        <p:spPr/>
+        <p:txBody>
+          <a:bodyPr/>
+          <a:lstStyle/>
+          <a:p>
+            <a:r>
+              <a:rPr lang="en-US" dirty="0" smtClean="0"/>
+              <a:t>Writing Arguments</a:t>
+            </a:r>
+            <a:endParaRPr lang="en-US" dirty="0"/>
+          </a:p>
+        </p:txBody>
+      </p:sp>
+      <p:sp>
+        <p:nvSpPr>
+          <p:cNvPr id="4" name="Slide Number Placeholder 3"/>
+          <p:cNvSpPr>
+            <a:spLocks noGrp="1"/>
+          </p:cNvSpPr>
+          <p:nvPr>
+            <p:ph type="sldNum" sz="quarter" idx="11"/>
+          </p:nvPr>
+        </p:nvSpPr>
+        <p:spPr/>
+        <p:txBody>
+          <a:bodyPr/>
+          <a:lstStyle/>
+          <a:p>
+            <a:fld id="{92CE3AC1-C231-4266-B594-3ACF466A7833}" type="slidenum">
+              <a:rPr lang="en-US" smtClean="0"/>
+              <a:pPr/>
+              <a:t>12</a:t>
+            </a:fld>
+            <a:endParaRPr lang="en-US" dirty="0"/>
+          </a:p>
+        </p:txBody>
+      </p:sp>
+      <p:pic>
+        <p:nvPicPr>
+          <p:cNvPr id="1026" name="Picture 2"/>
+          <p:cNvPicPr>
+            <a:picLocks noChangeAspect="1" noChangeArrowheads="1"/>
+          </p:cNvPicPr>
+          <p:nvPr/>
+        </p:nvPicPr>
+        <p:blipFill>
+          <a:blip r:embed="rId2"/>
+          <a:srcRect/>
+          <a:stretch>
+            <a:fillRect/>
+          </a:stretch>
+        </p:blipFill>
+        <p:spPr bwMode="auto">
+          <a:xfrm>
+            <a:off x="228600" y="1828800"/>
+            <a:ext cx="8915400" cy="4371975"/>
+          </a:xfrm>
+          <a:prstGeom prst="rect">
+            <a:avLst/>
+          </a:prstGeom>
+          <a:noFill/>
+          <a:ln w="9525">
+            <a:noFill/>
+            <a:miter lim="800000"/>
+            <a:headEnd/>
+            <a:tailEnd/>
+          </a:ln>
+          <a:effectLst/>
+        </p:spPr>
+      </p:pic>
+    </p:spTree>
+    <p:extLst>
+      <p:ext uri="{BB962C8B-B14F-4D97-AF65-F5344CB8AC3E}">
+        <p14:creationId xmlns:p14="http://schemas.microsoft.com/office/powerpoint/2010/main" val="41116130"/>
+      </p:ext>
+    </p:extLst>
+  </p:cSld>
+  <p:clrMapOvr>
+    <a:masterClrMapping/>
+  </p:clrMapOvr>
+  <p:transition>
+    <p:fade thruBlk="1"/>
+  </p:transition>
+  <p:timing>
+    <p:tnLst>
+      <p:par>
+        <p:cTn id="1" dur="indefinite" restart="never" nodeType="tmRoot"/>
+      </p:par>
+    </p:tnLst>
+  </p:timing>
+</p:sld>
+</file>
+
+<file path=ppt/slides/slide13.xml><?xml version="1.0" encoding="utf-8"?>
+<p:sld xmlns:a="http://schemas.openxmlformats.org/drawingml/2006/main" xmlns:r="http://schemas.openxmlformats.org/officeDocument/2006/relationships" xmlns:p="http://schemas.openxmlformats.org/presentationml/2006/main">
+  <p:cSld>
+    <p:spTree>
+      <p:nvGrpSpPr>
+        <p:cNvPr id="1" name=""/>
+        <p:cNvGrpSpPr/>
+        <p:nvPr/>
+      </p:nvGrpSpPr>
+      <p:grpSpPr>
+        <a:xfrm>
+          <a:off x="0" y="0"/>
+          <a:ext cx="0" cy="0"/>
+          <a:chOff x="0" y="0"/>
+          <a:chExt cx="0" cy="0"/>
+        </a:xfrm>
+      </p:grpSpPr>
+      <p:sp>
+        <p:nvSpPr>
+          <p:cNvPr id="2" name="Title 1"/>
+          <p:cNvSpPr>
+            <a:spLocks noGrp="1"/>
+          </p:cNvSpPr>
+          <p:nvPr>
+            <p:ph type="title"/>
+          </p:nvPr>
+        </p:nvSpPr>
+        <p:spPr/>
+        <p:txBody>
+          <a:bodyPr/>
+          <a:lstStyle/>
+          <a:p>
+            <a:r>
+              <a:rPr lang="en-US" dirty="0" smtClean="0"/>
+              <a:t>Running XML Write Demo</a:t>
+            </a:r>
+            <a:endParaRPr lang="en-US" dirty="0"/>
+          </a:p>
+        </p:txBody>
+      </p:sp>
+      <p:sp>
+        <p:nvSpPr>
+          <p:cNvPr id="3" name="Content Placeholder 2"/>
+          <p:cNvSpPr>
+            <a:spLocks noGrp="1"/>
+          </p:cNvSpPr>
+          <p:nvPr>
+            <p:ph idx="1"/>
+          </p:nvPr>
+        </p:nvSpPr>
+        <p:spPr/>
+        <p:txBody>
+          <a:bodyPr/>
+          <a:lstStyle/>
+          <a:p>
+            <a:pPr>
+              <a:lnSpc>
+                <a:spcPct val="150000"/>
+              </a:lnSpc>
+            </a:pPr>
+            <a:r>
+              <a:rPr lang="en-US" dirty="0" smtClean="0"/>
+              <a:t>Ran with parameters:</a:t>
+            </a:r>
+          </a:p>
+          <a:p>
+            <a:pPr>
+              <a:lnSpc>
+                <a:spcPct val="150000"/>
+              </a:lnSpc>
+            </a:pPr>
+            <a:endParaRPr lang="en-US" dirty="0" smtClean="0"/>
+          </a:p>
+          <a:p>
+            <a:pPr>
+              <a:lnSpc>
+                <a:spcPct val="150000"/>
+              </a:lnSpc>
+            </a:pPr>
+            <a:r>
+              <a:rPr lang="en-US" dirty="0" smtClean="0"/>
+              <a:t>Result:</a:t>
+            </a:r>
+            <a:br>
+              <a:rPr lang="en-US" dirty="0" smtClean="0"/>
+            </a:br>
+            <a:r>
+              <a:rPr lang="en-US" dirty="0" smtClean="0"/>
+              <a:t>	XML File</a:t>
+            </a:r>
+            <a:endParaRPr lang="en-US" dirty="0"/>
+          </a:p>
+        </p:txBody>
+      </p:sp>
+      <p:sp>
+        <p:nvSpPr>
+          <p:cNvPr id="4" name="Slide Number Placeholder 3"/>
+          <p:cNvSpPr>
+            <a:spLocks noGrp="1"/>
+          </p:cNvSpPr>
+          <p:nvPr>
+            <p:ph type="sldNum" sz="quarter" idx="11"/>
+          </p:nvPr>
+        </p:nvSpPr>
+        <p:spPr/>
+        <p:txBody>
+          <a:bodyPr/>
+          <a:lstStyle/>
+          <a:p>
+            <a:fld id="{92CE3AC1-C231-4266-B594-3ACF466A7833}" type="slidenum">
+              <a:rPr lang="en-US" smtClean="0"/>
+              <a:pPr/>
+              <a:t>13</a:t>
+            </a:fld>
+            <a:endParaRPr lang="en-US" dirty="0"/>
+          </a:p>
+        </p:txBody>
+      </p:sp>
+      <p:sp>
+        <p:nvSpPr>
+          <p:cNvPr id="5" name="Footer Placeholder 4"/>
+          <p:cNvSpPr>
+            <a:spLocks noGrp="1"/>
+          </p:cNvSpPr>
+          <p:nvPr>
+            <p:ph type="ftr" sz="quarter" idx="12"/>
+          </p:nvPr>
+        </p:nvSpPr>
+        <p:spPr/>
+        <p:txBody>
+          <a:bodyPr/>
+          <a:lstStyle/>
+          <a:p>
+            <a:endParaRPr lang="en-US" dirty="0"/>
+          </a:p>
+        </p:txBody>
+      </p:sp>
+      <p:pic>
+        <p:nvPicPr>
+          <p:cNvPr id="6" name="Picture 2"/>
+          <p:cNvPicPr>
+            <a:picLocks noChangeAspect="1" noChangeArrowheads="1"/>
+          </p:cNvPicPr>
+          <p:nvPr/>
+        </p:nvPicPr>
+        <p:blipFill>
+          <a:blip r:embed="rId2"/>
+          <a:srcRect t="25397" b="36508"/>
+          <a:stretch>
+            <a:fillRect/>
+          </a:stretch>
+        </p:blipFill>
+        <p:spPr bwMode="auto">
+          <a:xfrm>
+            <a:off x="914400" y="2590800"/>
+            <a:ext cx="7239000" cy="457200"/>
+          </a:xfrm>
+          <a:prstGeom prst="rect">
+            <a:avLst/>
+          </a:prstGeom>
+          <a:noFill/>
+          <a:ln w="9525">
+            <a:noFill/>
+            <a:miter lim="800000"/>
+            <a:headEnd/>
+            <a:tailEnd/>
+          </a:ln>
+          <a:effectLst/>
+        </p:spPr>
+      </p:pic>
+    </p:spTree>
+    <p:extLst>
+      <p:ext uri="{BB962C8B-B14F-4D97-AF65-F5344CB8AC3E}">
+        <p14:creationId xmlns:p14="http://schemas.microsoft.com/office/powerpoint/2010/main" val="1912412004"/>
+      </p:ext>
+    </p:extLst>
+  </p:cSld>
+  <p:clrMapOvr>
+    <a:masterClrMapping/>
+  </p:clrMapOvr>
+  <p:transition>
+    <p:fade thruBlk="1"/>
+  </p:transition>
+  <p:timing>
+    <p:tnLst>
+      <p:par>
+        <p:cTn id="1" dur="indefinite" restart="never" nodeType="tmRoot"/>
+      </p:par>
+    </p:tnLst>
+  </p:timing>
+</p:sld>
+</file>
+
+<file path=ppt/slides/slide14.xml><?xml version="1.0" encoding="utf-8"?>
+<p:sld xmlns:a="http://schemas.openxmlformats.org/drawingml/2006/main" xmlns:r="http://schemas.openxmlformats.org/officeDocument/2006/relationships" xmlns:p="http://schemas.openxmlformats.org/presentationml/2006/main">
+  <p:cSld>
+    <p:spTree>
+      <p:nvGrpSpPr>
+        <p:cNvPr id="1" name=""/>
+        <p:cNvGrpSpPr/>
+        <p:nvPr/>
+      </p:nvGrpSpPr>
+      <p:grpSpPr>
+        <a:xfrm>
+          <a:off x="0" y="0"/>
+          <a:ext cx="0" cy="0"/>
+          <a:chOff x="0" y="0"/>
+          <a:chExt cx="0" cy="0"/>
+        </a:xfrm>
+      </p:grpSpPr>
+      <p:sp>
+        <p:nvSpPr>
+          <p:cNvPr id="2" name="Title 1"/>
+          <p:cNvSpPr>
+            <a:spLocks noGrp="1"/>
+          </p:cNvSpPr>
+          <p:nvPr>
+            <p:ph type="title"/>
+          </p:nvPr>
+        </p:nvSpPr>
+        <p:spPr/>
+        <p:txBody>
+          <a:bodyPr/>
+          <a:lstStyle/>
+          <a:p>
+            <a:r>
+              <a:rPr lang="en-US" dirty="0" smtClean="0"/>
+              <a:t>Loading Arguments</a:t>
+            </a:r>
+            <a:endParaRPr lang="en-US" dirty="0"/>
+          </a:p>
+        </p:txBody>
+      </p:sp>
+      <p:sp>
+        <p:nvSpPr>
+          <p:cNvPr id="4" name="Slide Number Placeholder 3"/>
+          <p:cNvSpPr>
+            <a:spLocks noGrp="1"/>
+          </p:cNvSpPr>
+          <p:nvPr>
+            <p:ph type="sldNum" sz="quarter" idx="11"/>
+          </p:nvPr>
+        </p:nvSpPr>
+        <p:spPr/>
+        <p:txBody>
+          <a:bodyPr/>
+          <a:lstStyle/>
+          <a:p>
+            <a:fld id="{92CE3AC1-C231-4266-B594-3ACF466A7833}" type="slidenum">
+              <a:rPr lang="en-US" smtClean="0"/>
+              <a:pPr/>
+              <a:t>14</a:t>
+            </a:fld>
+            <a:endParaRPr lang="en-US" dirty="0"/>
+          </a:p>
+        </p:txBody>
+      </p:sp>
+      <p:pic>
+        <p:nvPicPr>
+          <p:cNvPr id="3074" name="Picture 2"/>
+          <p:cNvPicPr>
+            <a:picLocks noChangeAspect="1" noChangeArrowheads="1"/>
+          </p:cNvPicPr>
+          <p:nvPr/>
+        </p:nvPicPr>
+        <p:blipFill>
+          <a:blip r:embed="rId2"/>
+          <a:srcRect/>
+          <a:stretch>
+            <a:fillRect/>
+          </a:stretch>
+        </p:blipFill>
+        <p:spPr bwMode="auto">
+          <a:xfrm>
+            <a:off x="0" y="1981200"/>
+            <a:ext cx="9144000" cy="3505200"/>
+          </a:xfrm>
+          <a:prstGeom prst="rect">
+            <a:avLst/>
+          </a:prstGeom>
+          <a:noFill/>
+          <a:ln w="9525">
+            <a:noFill/>
+            <a:miter lim="800000"/>
+            <a:headEnd/>
+            <a:tailEnd/>
+          </a:ln>
+          <a:effectLst/>
+        </p:spPr>
+      </p:pic>
+    </p:spTree>
+    <p:extLst>
+      <p:ext uri="{BB962C8B-B14F-4D97-AF65-F5344CB8AC3E}">
+        <p14:creationId xmlns:p14="http://schemas.microsoft.com/office/powerpoint/2010/main" val="1676183990"/>
+      </p:ext>
+    </p:extLst>
+  </p:cSld>
+  <p:clrMapOvr>
+    <a:masterClrMapping/>
+  </p:clrMapOvr>
+  <p:transition>
+    <p:fade thruBlk="1"/>
+  </p:transition>
+  <p:timing>
+    <p:tnLst>
+      <p:par>
+        <p:cTn id="1" dur="indefinite" restart="never" nodeType="tmRoot"/>
+      </p:par>
+    </p:tnLst>
+  </p:timing>
+</p:sld>
+</file>
+
+<file path=ppt/slides/slide15.xml><?xml version="1.0" encoding="utf-8"?>
+<p:sld xmlns:a="http://schemas.openxmlformats.org/drawingml/2006/main" xmlns:r="http://schemas.openxmlformats.org/officeDocument/2006/relationships" xmlns:p="http://schemas.openxmlformats.org/presentationml/2006/main">
+  <p:cSld>
+    <p:spTree>
+      <p:nvGrpSpPr>
+        <p:cNvPr id="1" name=""/>
+        <p:cNvGrpSpPr/>
+        <p:nvPr/>
+      </p:nvGrpSpPr>
+      <p:grpSpPr>
+        <a:xfrm>
+          <a:off x="0" y="0"/>
+          <a:ext cx="0" cy="0"/>
+          <a:chOff x="0" y="0"/>
+          <a:chExt cx="0" cy="0"/>
+        </a:xfrm>
+      </p:grpSpPr>
+      <p:sp>
+        <p:nvSpPr>
+          <p:cNvPr id="2" name="Title 1"/>
+          <p:cNvSpPr>
+            <a:spLocks noGrp="1"/>
+          </p:cNvSpPr>
+          <p:nvPr>
+            <p:ph type="title"/>
+          </p:nvPr>
+        </p:nvSpPr>
+        <p:spPr/>
+        <p:txBody>
+          <a:bodyPr/>
+          <a:lstStyle/>
+          <a:p>
+            <a:r>
               <a:rPr lang="en-US" dirty="0" smtClean="0"/>
               <a:t>Running XML Load Demo</a:t>
             </a:r>
@@ -5409,7 +6592,7 @@
             <a:fld id="{92CE3AC1-C231-4266-B594-3ACF466A7833}" type="slidenum">
               <a:rPr lang="en-US" smtClean="0"/>
               <a:pPr/>
-              <a:t>10</a:t>
+              <a:t>15</a:t>
             </a:fld>
             <a:endParaRPr lang="en-US" dirty="0"/>
           </a:p>
@@ -5503,7 +6686,7 @@
     </p:spTree>
     <p:extLst>
       <p:ext uri="{BB962C8B-B14F-4D97-AF65-F5344CB8AC3E}">
-        <p14:creationId xmlns:p14="http://schemas.microsoft.com/office/powerpoint/2010/main" xmlns="" val="3242737841"/>
+        <p14:creationId xmlns:p14="http://schemas.microsoft.com/office/powerpoint/2010/main" val="1630300522"/>
       </p:ext>
     </p:extLst>
   </p:cSld>
@@ -5523,7 +6706,7 @@
 </p:sld>
 </file>
 
-<file path=ppt/slides/slide11.xml><?xml version="1.0" encoding="utf-8"?>
+<file path=ppt/slides/slide16.xml><?xml version="1.0" encoding="utf-8"?>
 <p:sld xmlns:a="http://schemas.openxmlformats.org/drawingml/2006/main" xmlns:r="http://schemas.openxmlformats.org/officeDocument/2006/relationships" xmlns:p="http://schemas.openxmlformats.org/presentationml/2006/main">
   <p:cSld>
     <p:spTree>
@@ -5583,7 +6766,7 @@
             <a:fld id="{92CE3AC1-C231-4266-B594-3ACF466A7833}" type="slidenum">
               <a:rPr lang="en-US" smtClean="0"/>
               <a:pPr/>
-              <a:t>11</a:t>
+              <a:t>16</a:t>
             </a:fld>
             <a:endParaRPr lang="en-US" dirty="0"/>
           </a:p>
@@ -5625,7 +6808,7 @@
     </p:spTree>
     <p:extLst>
       <p:ext uri="{BB962C8B-B14F-4D97-AF65-F5344CB8AC3E}">
-        <p14:creationId xmlns:p14="http://schemas.microsoft.com/office/powerpoint/2010/main" xmlns="" val="2435922435"/>
+        <p14:creationId xmlns:p14="http://schemas.microsoft.com/office/powerpoint/2010/main" val="764690615"/>
       </p:ext>
     </p:extLst>
   </p:cSld>
@@ -5645,7 +6828,7 @@
 </p:sld>
 </file>
 
-<file path=ppt/slides/slide12.xml><?xml version="1.0" encoding="utf-8"?>
+<file path=ppt/slides/slide17.xml><?xml version="1.0" encoding="utf-8"?>
 <p:sld xmlns:a="http://schemas.openxmlformats.org/drawingml/2006/main" xmlns:r="http://schemas.openxmlformats.org/officeDocument/2006/relationships" xmlns:p="http://schemas.openxmlformats.org/presentationml/2006/main">
   <p:cSld>
     <p:spTree>
@@ -5773,7 +6956,7 @@
             <a:fld id="{92CE3AC1-C231-4266-B594-3ACF466A7833}" type="slidenum">
               <a:rPr lang="en-US" smtClean="0"/>
               <a:pPr/>
-              <a:t>12</a:t>
+              <a:t>17</a:t>
             </a:fld>
             <a:endParaRPr lang="en-US" dirty="0"/>
           </a:p>
@@ -5848,7 +7031,7 @@
     </p:spTree>
     <p:extLst>
       <p:ext uri="{BB962C8B-B14F-4D97-AF65-F5344CB8AC3E}">
-        <p14:creationId xmlns:p14="http://schemas.microsoft.com/office/powerpoint/2010/main" xmlns="" val="2967869899"/>
+        <p14:creationId xmlns:p14="http://schemas.microsoft.com/office/powerpoint/2010/main" val="1128234436"/>
       </p:ext>
     </p:extLst>
   </p:cSld>
@@ -5868,7 +7051,7 @@
 </p:sld>
 </file>
 
-<file path=ppt/slides/slide13.xml><?xml version="1.0" encoding="utf-8"?>
+<file path=ppt/slides/slide18.xml><?xml version="1.0" encoding="utf-8"?>
 <p:sld xmlns:a="http://schemas.openxmlformats.org/drawingml/2006/main" xmlns:r="http://schemas.openxmlformats.org/officeDocument/2006/relationships" xmlns:p="http://schemas.openxmlformats.org/presentationml/2006/main">
   <p:cSld>
     <p:spTree>
@@ -5983,7 +7166,7 @@
             <a:fld id="{92CE3AC1-C231-4266-B594-3ACF466A7833}" type="slidenum">
               <a:rPr lang="en-US" smtClean="0"/>
               <a:pPr/>
-              <a:t>13</a:t>
+              <a:t>18</a:t>
             </a:fld>
             <a:endParaRPr lang="en-US" dirty="0"/>
           </a:p>
@@ -6058,7 +7241,7 @@
     </p:spTree>
     <p:extLst>
       <p:ext uri="{BB962C8B-B14F-4D97-AF65-F5344CB8AC3E}">
-        <p14:creationId xmlns:p14="http://schemas.microsoft.com/office/powerpoint/2010/main" xmlns="" val="2724496813"/>
+        <p14:creationId xmlns:p14="http://schemas.microsoft.com/office/powerpoint/2010/main" val="514517964"/>
       </p:ext>
     </p:extLst>
   </p:cSld>
@@ -6078,7 +7261,7 @@
 </p:sld>
 </file>
 
-<file path=ppt/slides/slide14.xml><?xml version="1.0" encoding="utf-8"?>
+<file path=ppt/slides/slide19.xml><?xml version="1.0" encoding="utf-8"?>
 <p:sld xmlns:a="http://schemas.openxmlformats.org/drawingml/2006/main" xmlns:r="http://schemas.openxmlformats.org/officeDocument/2006/relationships" xmlns:p="http://schemas.openxmlformats.org/presentationml/2006/main">
   <p:cSld>
     <p:spTree>
@@ -6173,7 +7356,7 @@
             <a:fld id="{92CE3AC1-C231-4266-B594-3ACF466A7833}" type="slidenum">
               <a:rPr lang="en-US" smtClean="0"/>
               <a:pPr/>
-              <a:t>14</a:t>
+              <a:t>19</a:t>
             </a:fld>
             <a:endParaRPr lang="en-US" dirty="0"/>
           </a:p>
@@ -6248,7 +7431,7 @@
     </p:spTree>
     <p:extLst>
       <p:ext uri="{BB962C8B-B14F-4D97-AF65-F5344CB8AC3E}">
-        <p14:creationId xmlns:p14="http://schemas.microsoft.com/office/powerpoint/2010/main" xmlns="" val="2207061249"/>
+        <p14:creationId xmlns:p14="http://schemas.microsoft.com/office/powerpoint/2010/main" val="2984901957"/>
       </p:ext>
     </p:extLst>
   </p:cSld>
@@ -6261,7 +7444,7 @@
 </p:sld>
 </file>
 
-<file path=ppt/slides/slide15.xml><?xml version="1.0" encoding="utf-8"?>
+<file path=ppt/slides/slide2.xml><?xml version="1.0" encoding="utf-8"?>
 <p:sld xmlns:a="http://schemas.openxmlformats.org/drawingml/2006/main" xmlns:r="http://schemas.openxmlformats.org/officeDocument/2006/relationships" xmlns:p="http://schemas.openxmlformats.org/presentationml/2006/main">
   <p:cSld>
     <p:spTree>
@@ -6290,37 +7473,74 @@
         </p:nvSpPr>
         <p:spPr/>
         <p:txBody>
+          <a:bodyPr>
+            <a:normAutofit fontScale="90000"/>
+          </a:bodyPr>
+          <a:lstStyle/>
+          <a:p>
+            <a:r>
+              <a:rPr lang="en-US" dirty="0" smtClean="0"/>
+              <a:t>Overview</a:t>
+            </a:r>
+            <a:br>
+              <a:rPr lang="en-US" dirty="0" smtClean="0"/>
+            </a:br>
+            <a:endParaRPr lang="en-US" dirty="0"/>
+          </a:p>
+        </p:txBody>
+      </p:sp>
+      <p:sp>
+        <p:nvSpPr>
+          <p:cNvPr id="3" name="Content Placeholder 2"/>
+          <p:cNvSpPr>
+            <a:spLocks noGrp="1"/>
+          </p:cNvSpPr>
+          <p:nvPr>
+            <p:ph idx="1"/>
+          </p:nvPr>
+        </p:nvSpPr>
+        <p:spPr/>
+        <p:txBody>
           <a:bodyPr/>
           <a:lstStyle/>
           <a:p>
             <a:r>
               <a:rPr lang="en-US" dirty="0" err="1" smtClean="0"/>
-              <a:t>Burndown</a:t>
-            </a:r>
-            <a:r>
-              <a:rPr lang="en-US" dirty="0" smtClean="0"/>
-              <a:t> Chart</a:t>
-            </a:r>
-            <a:endParaRPr lang="en-US" dirty="0"/>
-          </a:p>
-        </p:txBody>
-      </p:sp>
-      <p:sp>
-        <p:nvSpPr>
-          <p:cNvPr id="3" name="Content Placeholder 2"/>
-          <p:cNvSpPr>
-            <a:spLocks noGrp="1"/>
-          </p:cNvSpPr>
-          <p:nvPr>
-            <p:ph idx="1"/>
-          </p:nvPr>
-        </p:nvSpPr>
-        <p:spPr/>
-        <p:txBody>
-          <a:bodyPr/>
-          <a:lstStyle/>
-          <a:p>
-            <a:endParaRPr lang="en-US"/>
+              <a:t>ArgumentParser</a:t>
+            </a:r>
+            <a:r>
+              <a:rPr lang="en-US" dirty="0" smtClean="0"/>
+              <a:t> allows for the creation of different types of arguments and store data parsed from the command line.</a:t>
+            </a:r>
+          </a:p>
+          <a:p>
+            <a:r>
+              <a:rPr lang="en-US" dirty="0" smtClean="0"/>
+              <a:t>Allows created arguments to be saved to and loaded from an XML file using the </a:t>
+            </a:r>
+            <a:r>
+              <a:rPr lang="en-US" dirty="0" err="1" smtClean="0"/>
+              <a:t>XMLManager</a:t>
+            </a:r>
+            <a:r>
+              <a:rPr lang="en-US" dirty="0" smtClean="0"/>
+              <a:t> class.</a:t>
+            </a:r>
+          </a:p>
+          <a:p>
+            <a:r>
+              <a:rPr lang="en-US" dirty="0" smtClean="0"/>
+              <a:t>In-depth documentation found at </a:t>
+            </a:r>
+            <a:r>
+              <a:rPr lang="en-US" u="sng" dirty="0" smtClean="0"/>
+              <a:t>add link here</a:t>
+            </a:r>
+            <a:r>
+              <a:rPr lang="en-US" dirty="0" smtClean="0"/>
+              <a:t> </a:t>
+            </a:r>
+            <a:endParaRPr lang="en-US" dirty="0"/>
           </a:p>
         </p:txBody>
       </p:sp>
@@ -6342,27 +7562,8 @@
             <a:fld id="{92CE3AC1-C231-4266-B594-3ACF466A7833}" type="slidenum">
               <a:rPr lang="en-US" smtClean="0"/>
               <a:pPr/>
-              <a:t>15</a:t>
+              <a:t>2</a:t>
             </a:fld>
-            <a:endParaRPr lang="en-US" dirty="0"/>
-          </a:p>
-        </p:txBody>
-      </p:sp>
-      <p:sp>
-        <p:nvSpPr>
-          <p:cNvPr id="5" name="Footer Placeholder 4"/>
-          <p:cNvSpPr>
-            <a:spLocks noGrp="1"/>
-          </p:cNvSpPr>
-          <p:nvPr>
-            <p:ph type="ftr" sz="quarter" idx="12"/>
-          </p:nvPr>
-        </p:nvSpPr>
-        <p:spPr/>
-        <p:txBody>
-          <a:bodyPr/>
-          <a:lstStyle/>
-          <a:p>
             <a:endParaRPr lang="en-US" dirty="0"/>
           </a:p>
         </p:txBody>
@@ -6370,7 +7571,7 @@
     </p:spTree>
     <p:extLst>
       <p:ext uri="{BB962C8B-B14F-4D97-AF65-F5344CB8AC3E}">
-        <p14:creationId xmlns:p14="http://schemas.microsoft.com/office/powerpoint/2010/main" xmlns="" val="3224086378"/>
+        <p14:creationId xmlns:p14="http://schemas.microsoft.com/office/powerpoint/2010/main" val="2982209603"/>
       </p:ext>
     </p:extLst>
   </p:cSld>
@@ -6380,10 +7581,17 @@
   <p:transition>
     <p:fade thruBlk="1"/>
   </p:transition>
+  <p:timing>
+    <p:tnLst>
+      <p:par>
+        <p:cTn id="1" dur="indefinite" restart="never" nodeType="tmRoot"/>
+      </p:par>
+    </p:tnLst>
+  </p:timing>
 </p:sld>
 </file>
 
-<file path=ppt/slides/slide16.xml><?xml version="1.0" encoding="utf-8"?>
+<file path=ppt/slides/slide20.xml><?xml version="1.0" encoding="utf-8"?>
 <p:sld xmlns:a="http://schemas.openxmlformats.org/drawingml/2006/main" xmlns:r="http://schemas.openxmlformats.org/officeDocument/2006/relationships" xmlns:p="http://schemas.openxmlformats.org/presentationml/2006/main">
   <p:cSld>
     <p:spTree>
@@ -6412,14 +7620,16 @@
         </p:nvSpPr>
         <p:spPr/>
         <p:txBody>
-          <a:bodyPr/>
-          <a:lstStyle/>
-          <a:p>
-            <a:r>
-              <a:rPr lang="en-US" dirty="0" smtClean="0"/>
-              <a:t>SCRUM Stuff</a:t>
-            </a:r>
-            <a:endParaRPr lang="en-US" dirty="0"/>
+          <a:bodyPr>
+            <a:normAutofit fontScale="90000"/>
+          </a:bodyPr>
+          <a:lstStyle/>
+          <a:p>
+            <a:r>
+              <a:rPr lang="en-US" sz="3600" dirty="0" smtClean="0"/>
+              <a:t>Agile Estimating and Planning Technique</a:t>
+            </a:r>
+            <a:endParaRPr lang="en-US" sz="3600" dirty="0"/>
           </a:p>
         </p:txBody>
       </p:sp>
@@ -6438,7 +7648,155 @@
           <a:bodyPr/>
           <a:lstStyle/>
           <a:p>
-            <a:endParaRPr lang="en-US"/>
+            <a:r>
+              <a:rPr lang="en-US" dirty="0" smtClean="0"/>
+              <a:t>Story Points</a:t>
+            </a:r>
+          </a:p>
+          <a:p>
+            <a:r>
+              <a:rPr lang="en-US" dirty="0" smtClean="0"/>
+              <a:t>Planning Poker</a:t>
+            </a:r>
+          </a:p>
+          <a:p>
+            <a:pPr lvl="1">
+              <a:buClr>
+                <a:srgbClr val="FF0000"/>
+              </a:buClr>
+              <a:buFont typeface="Wingdings" panose="05000000000000000000" pitchFamily="2" charset="2"/>
+              <a:buChar char="q"/>
+            </a:pPr>
+            <a:r>
+              <a:rPr lang="en-US" dirty="0" smtClean="0"/>
+              <a:t>1 = easy</a:t>
+            </a:r>
+          </a:p>
+          <a:p>
+            <a:pPr lvl="1">
+              <a:buClr>
+                <a:srgbClr val="FF0000"/>
+              </a:buClr>
+              <a:buFont typeface="Wingdings" panose="05000000000000000000" pitchFamily="2" charset="2"/>
+              <a:buChar char="q"/>
+            </a:pPr>
+            <a:r>
+              <a:rPr lang="en-US" dirty="0" smtClean="0"/>
+              <a:t>2 = fairly easy</a:t>
+            </a:r>
+          </a:p>
+          <a:p>
+            <a:pPr lvl="1">
+              <a:buClr>
+                <a:srgbClr val="FF0000"/>
+              </a:buClr>
+              <a:buFont typeface="Wingdings" panose="05000000000000000000" pitchFamily="2" charset="2"/>
+              <a:buChar char="q"/>
+            </a:pPr>
+            <a:r>
+              <a:rPr lang="en-US" dirty="0" smtClean="0"/>
+              <a:t>3 = moderate </a:t>
+            </a:r>
+          </a:p>
+          <a:p>
+            <a:pPr lvl="1">
+              <a:buClr>
+                <a:srgbClr val="FF0000"/>
+              </a:buClr>
+              <a:buFont typeface="Wingdings" panose="05000000000000000000" pitchFamily="2" charset="2"/>
+              <a:buChar char="q"/>
+            </a:pPr>
+            <a:r>
+              <a:rPr lang="en-US" dirty="0" smtClean="0"/>
+              <a:t>5 = fairly difficult</a:t>
+            </a:r>
+          </a:p>
+          <a:p>
+            <a:pPr lvl="1">
+              <a:buClr>
+                <a:srgbClr val="FF0000"/>
+              </a:buClr>
+              <a:buFont typeface="Wingdings" panose="05000000000000000000" pitchFamily="2" charset="2"/>
+              <a:buChar char="q"/>
+            </a:pPr>
+            <a:r>
+              <a:rPr lang="en-US" dirty="0" smtClean="0"/>
+              <a:t>8 = difficult </a:t>
+            </a:r>
+          </a:p>
+          <a:p>
+            <a:r>
+              <a:rPr lang="en-US" dirty="0" smtClean="0"/>
+              <a:t>Total of 78 story points</a:t>
+            </a:r>
+            <a:endParaRPr lang="en-US" dirty="0"/>
+          </a:p>
+        </p:txBody>
+      </p:sp>
+    </p:spTree>
+    <p:extLst>
+      <p:ext uri="{BB962C8B-B14F-4D97-AF65-F5344CB8AC3E}">
+        <p14:creationId xmlns:p14="http://schemas.microsoft.com/office/powerpoint/2010/main" val="403823625"/>
+      </p:ext>
+    </p:extLst>
+  </p:cSld>
+  <p:clrMapOvr>
+    <a:masterClrMapping/>
+  </p:clrMapOvr>
+  <p:transition>
+    <p:fade thruBlk="1"/>
+  </p:transition>
+  <p:timing>
+    <p:tnLst>
+      <p:par>
+        <p:cTn id="1" dur="indefinite" restart="never" nodeType="tmRoot"/>
+      </p:par>
+    </p:tnLst>
+  </p:timing>
+</p:sld>
+</file>
+
+<file path=ppt/slides/slide21.xml><?xml version="1.0" encoding="utf-8"?>
+<p:sld xmlns:a="http://schemas.openxmlformats.org/drawingml/2006/main" xmlns:r="http://schemas.openxmlformats.org/officeDocument/2006/relationships" xmlns:p="http://schemas.openxmlformats.org/presentationml/2006/main">
+  <p:cSld>
+    <p:spTree>
+      <p:nvGrpSpPr>
+        <p:cNvPr id="1" name=""/>
+        <p:cNvGrpSpPr/>
+        <p:nvPr/>
+      </p:nvGrpSpPr>
+      <p:grpSpPr>
+        <a:xfrm>
+          <a:off x="0" y="0"/>
+          <a:ext cx="0" cy="0"/>
+          <a:chOff x="0" y="0"/>
+          <a:chExt cx="0" cy="0"/>
+        </a:xfrm>
+      </p:grpSpPr>
+      <p:sp>
+        <p:nvSpPr>
+          <p:cNvPr id="2" name="Title 1"/>
+          <p:cNvSpPr>
+            <a:spLocks noGrp="1"/>
+          </p:cNvSpPr>
+          <p:nvPr>
+            <p:ph type="title"/>
+          </p:nvPr>
+        </p:nvSpPr>
+        <p:spPr/>
+        <p:txBody>
+          <a:bodyPr/>
+          <a:lstStyle/>
+          <a:p>
+            <a:r>
+              <a:rPr lang="en-US" dirty="0" err="1" smtClean="0"/>
+              <a:t>Burndown</a:t>
+            </a:r>
+            <a:r>
+              <a:rPr lang="en-US" dirty="0" smtClean="0"/>
+              <a:t> Chart</a:t>
+            </a:r>
+            <a:endParaRPr lang="en-US" dirty="0"/>
           </a:p>
         </p:txBody>
       </p:sp>
@@ -6460,7 +7818,7 @@
             <a:fld id="{92CE3AC1-C231-4266-B594-3ACF466A7833}" type="slidenum">
               <a:rPr lang="en-US" smtClean="0"/>
               <a:pPr/>
-              <a:t>16</a:t>
+              <a:t>21</a:t>
             </a:fld>
             <a:endParaRPr lang="en-US" dirty="0"/>
           </a:p>
@@ -6485,10 +7843,31 @@
           </a:p>
         </p:txBody>
       </p:sp>
+      <p:graphicFrame>
+        <p:nvGraphicFramePr>
+          <p:cNvPr id="6" name="Content Placeholder 13"/>
+          <p:cNvGraphicFramePr>
+            <a:graphicFrameLocks noGrp="1"/>
+          </p:cNvGraphicFramePr>
+          <p:nvPr>
+            <p:ph idx="1"/>
+            <p:extLst/>
+          </p:nvPr>
+        </p:nvGraphicFramePr>
+        <p:xfrm>
+          <a:off x="457200" y="1600200"/>
+          <a:ext cx="8229600" cy="4525963"/>
+        </p:xfrm>
+        <a:graphic>
+          <a:graphicData uri="http://schemas.openxmlformats.org/drawingml/2006/chart">
+            <c:chart xmlns:c="http://schemas.openxmlformats.org/drawingml/2006/chart" xmlns:r="http://schemas.openxmlformats.org/officeDocument/2006/relationships" r:id="rId2"/>
+          </a:graphicData>
+        </a:graphic>
+      </p:graphicFrame>
     </p:spTree>
     <p:extLst>
       <p:ext uri="{BB962C8B-B14F-4D97-AF65-F5344CB8AC3E}">
-        <p14:creationId xmlns:p14="http://schemas.microsoft.com/office/powerpoint/2010/main" xmlns="" val="3923902479"/>
+        <p14:creationId xmlns:p14="http://schemas.microsoft.com/office/powerpoint/2010/main" val="247812984"/>
       </p:ext>
     </p:extLst>
   </p:cSld>
@@ -6501,7 +7880,125 @@
 </p:sld>
 </file>
 
-<file path=ppt/slides/slide17.xml><?xml version="1.0" encoding="utf-8"?>
+<file path=ppt/slides/slide22.xml><?xml version="1.0" encoding="utf-8"?>
+<p:sld xmlns:a="http://schemas.openxmlformats.org/drawingml/2006/main" xmlns:r="http://schemas.openxmlformats.org/officeDocument/2006/relationships" xmlns:p="http://schemas.openxmlformats.org/presentationml/2006/main">
+  <p:cSld>
+    <p:spTree>
+      <p:nvGrpSpPr>
+        <p:cNvPr id="1" name=""/>
+        <p:cNvGrpSpPr/>
+        <p:nvPr/>
+      </p:nvGrpSpPr>
+      <p:grpSpPr>
+        <a:xfrm>
+          <a:off x="0" y="0"/>
+          <a:ext cx="0" cy="0"/>
+          <a:chOff x="0" y="0"/>
+          <a:chExt cx="0" cy="0"/>
+        </a:xfrm>
+      </p:grpSpPr>
+      <p:sp>
+        <p:nvSpPr>
+          <p:cNvPr id="2" name="Title 1"/>
+          <p:cNvSpPr>
+            <a:spLocks noGrp="1"/>
+          </p:cNvSpPr>
+          <p:nvPr>
+            <p:ph type="title"/>
+          </p:nvPr>
+        </p:nvSpPr>
+        <p:spPr/>
+        <p:txBody>
+          <a:bodyPr/>
+          <a:lstStyle/>
+          <a:p>
+            <a:r>
+              <a:rPr lang="en-US" dirty="0" smtClean="0"/>
+              <a:t>SCRUM Stuff</a:t>
+            </a:r>
+            <a:endParaRPr lang="en-US" dirty="0"/>
+          </a:p>
+        </p:txBody>
+      </p:sp>
+      <p:sp>
+        <p:nvSpPr>
+          <p:cNvPr id="3" name="Content Placeholder 2"/>
+          <p:cNvSpPr>
+            <a:spLocks noGrp="1"/>
+          </p:cNvSpPr>
+          <p:nvPr>
+            <p:ph idx="1"/>
+          </p:nvPr>
+        </p:nvSpPr>
+        <p:spPr/>
+        <p:txBody>
+          <a:bodyPr/>
+          <a:lstStyle/>
+          <a:p>
+            <a:endParaRPr lang="en-US"/>
+          </a:p>
+        </p:txBody>
+      </p:sp>
+      <p:sp>
+        <p:nvSpPr>
+          <p:cNvPr id="4" name="Slide Number Placeholder 3"/>
+          <p:cNvSpPr>
+            <a:spLocks noGrp="1"/>
+          </p:cNvSpPr>
+          <p:nvPr>
+            <p:ph type="sldNum" sz="quarter" idx="11"/>
+          </p:nvPr>
+        </p:nvSpPr>
+        <p:spPr/>
+        <p:txBody>
+          <a:bodyPr/>
+          <a:lstStyle/>
+          <a:p>
+            <a:fld id="{92CE3AC1-C231-4266-B594-3ACF466A7833}" type="slidenum">
+              <a:rPr lang="en-US" smtClean="0"/>
+              <a:pPr/>
+              <a:t>22</a:t>
+            </a:fld>
+            <a:endParaRPr lang="en-US" dirty="0"/>
+          </a:p>
+        </p:txBody>
+      </p:sp>
+      <p:sp>
+        <p:nvSpPr>
+          <p:cNvPr id="5" name="Footer Placeholder 4"/>
+          <p:cNvSpPr>
+            <a:spLocks noGrp="1"/>
+          </p:cNvSpPr>
+          <p:nvPr>
+            <p:ph type="ftr" sz="quarter" idx="12"/>
+          </p:nvPr>
+        </p:nvSpPr>
+        <p:spPr/>
+        <p:txBody>
+          <a:bodyPr/>
+          <a:lstStyle/>
+          <a:p>
+            <a:endParaRPr lang="en-US" dirty="0"/>
+          </a:p>
+        </p:txBody>
+      </p:sp>
+    </p:spTree>
+    <p:extLst>
+      <p:ext uri="{BB962C8B-B14F-4D97-AF65-F5344CB8AC3E}">
+        <p14:creationId xmlns:p14="http://schemas.microsoft.com/office/powerpoint/2010/main" val="990343875"/>
+      </p:ext>
+    </p:extLst>
+  </p:cSld>
+  <p:clrMapOvr>
+    <a:masterClrMapping/>
+  </p:clrMapOvr>
+  <p:transition>
+    <p:fade thruBlk="1"/>
+  </p:transition>
+</p:sld>
+</file>
+
+<file path=ppt/slides/slide23.xml><?xml version="1.0" encoding="utf-8"?>
 <p:sld xmlns:a="http://schemas.openxmlformats.org/drawingml/2006/main" xmlns:r="http://schemas.openxmlformats.org/officeDocument/2006/relationships" xmlns:p="http://schemas.openxmlformats.org/presentationml/2006/main">
   <p:cSld>
     <p:spTree>
@@ -6608,7 +8105,7 @@
             <a:fld id="{92CE3AC1-C231-4266-B594-3ACF466A7833}" type="slidenum">
               <a:rPr lang="en-US" smtClean="0"/>
               <a:pPr/>
-              <a:t>17</a:t>
+              <a:t>23</a:t>
             </a:fld>
             <a:endParaRPr lang="en-US" dirty="0"/>
           </a:p>
@@ -6629,148 +8126,6 @@
           <a:bodyPr/>
           <a:lstStyle/>
           <a:p>
-            <a:endParaRPr lang="en-US" dirty="0"/>
-          </a:p>
-        </p:txBody>
-      </p:sp>
-    </p:spTree>
-  </p:cSld>
-  <p:clrMapOvr>
-    <a:masterClrMapping/>
-  </p:clrMapOvr>
-  <p:transition>
-    <p:fade thruBlk="1"/>
-  </p:transition>
-  <p:timing>
-    <p:tnLst>
-      <p:par>
-        <p:cTn id="1" dur="indefinite" restart="never" nodeType="tmRoot"/>
-      </p:par>
-    </p:tnLst>
-  </p:timing>
-</p:sld>
-</file>
-
-<file path=ppt/slides/slide2.xml><?xml version="1.0" encoding="utf-8"?>
-<p:sld xmlns:a="http://schemas.openxmlformats.org/drawingml/2006/main" xmlns:r="http://schemas.openxmlformats.org/officeDocument/2006/relationships" xmlns:p="http://schemas.openxmlformats.org/presentationml/2006/main">
-  <p:cSld>
-    <p:spTree>
-      <p:nvGrpSpPr>
-        <p:cNvPr id="1" name=""/>
-        <p:cNvGrpSpPr/>
-        <p:nvPr/>
-      </p:nvGrpSpPr>
-      <p:grpSpPr>
-        <a:xfrm>
-          <a:off x="0" y="0"/>
-          <a:ext cx="0" cy="0"/>
-          <a:chOff x="0" y="0"/>
-          <a:chExt cx="0" cy="0"/>
-        </a:xfrm>
-      </p:grpSpPr>
-      <p:sp>
-        <p:nvSpPr>
-          <p:cNvPr id="2" name="Title 1"/>
-          <p:cNvSpPr>
-            <a:spLocks noGrp="1"/>
-          </p:cNvSpPr>
-          <p:nvPr>
-            <p:ph type="title"/>
-          </p:nvPr>
-        </p:nvSpPr>
-        <p:spPr/>
-        <p:txBody>
-          <a:bodyPr>
-            <a:normAutofit fontScale="90000"/>
-          </a:bodyPr>
-          <a:lstStyle/>
-          <a:p>
-            <a:r>
-              <a:rPr lang="en-US" dirty="0" smtClean="0"/>
-              <a:t>Overview</a:t>
-            </a:r>
-            <a:br>
-              <a:rPr lang="en-US" dirty="0" smtClean="0"/>
-            </a:br>
-            <a:endParaRPr lang="en-US" dirty="0"/>
-          </a:p>
-        </p:txBody>
-      </p:sp>
-      <p:sp>
-        <p:nvSpPr>
-          <p:cNvPr id="3" name="Content Placeholder 2"/>
-          <p:cNvSpPr>
-            <a:spLocks noGrp="1"/>
-          </p:cNvSpPr>
-          <p:nvPr>
-            <p:ph idx="1"/>
-          </p:nvPr>
-        </p:nvSpPr>
-        <p:spPr/>
-        <p:txBody>
-          <a:bodyPr/>
-          <a:lstStyle/>
-          <a:p>
-            <a:r>
-              <a:rPr lang="en-US" dirty="0" err="1" smtClean="0"/>
-              <a:t>ArgumentParser</a:t>
-            </a:r>
-            <a:r>
-              <a:rPr lang="en-US" dirty="0" smtClean="0"/>
-              <a:t> allows for the creation of different types of arguments and store data parsed from the command line.</a:t>
-            </a:r>
-          </a:p>
-          <a:p>
-            <a:r>
-              <a:rPr lang="en-US" dirty="0" smtClean="0"/>
-              <a:t>Allows created arguments to be saved to and loaded from an XML file using the </a:t>
-            </a:r>
-            <a:r>
-              <a:rPr lang="en-US" dirty="0" err="1" smtClean="0"/>
-              <a:t>XMLManager</a:t>
-            </a:r>
-            <a:r>
-              <a:rPr lang="en-US" dirty="0" smtClean="0"/>
-              <a:t> class.</a:t>
-            </a:r>
-          </a:p>
-          <a:p>
-            <a:r>
-              <a:rPr lang="en-US" dirty="0" smtClean="0"/>
-              <a:t>In-depth documentation found at </a:t>
-            </a:r>
-            <a:r>
-              <a:rPr lang="en-US" u="sng" dirty="0" smtClean="0"/>
-              <a:t>add link here</a:t>
-            </a:r>
-            <a:r>
-              <a:rPr lang="en-US" dirty="0" smtClean="0"/>
-              <a:t> </a:t>
-            </a:r>
-            <a:endParaRPr lang="en-US" dirty="0"/>
-          </a:p>
-        </p:txBody>
-      </p:sp>
-      <p:sp>
-        <p:nvSpPr>
-          <p:cNvPr id="4" name="Slide Number Placeholder 3"/>
-          <p:cNvSpPr>
-            <a:spLocks noGrp="1"/>
-          </p:cNvSpPr>
-          <p:nvPr>
-            <p:ph type="sldNum" sz="quarter" idx="11"/>
-          </p:nvPr>
-        </p:nvSpPr>
-        <p:spPr/>
-        <p:txBody>
-          <a:bodyPr/>
-          <a:lstStyle/>
-          <a:p>
-            <a:fld id="{92CE3AC1-C231-4266-B594-3ACF466A7833}" type="slidenum">
-              <a:rPr lang="en-US" smtClean="0"/>
-              <a:pPr/>
-              <a:t>2</a:t>
-            </a:fld>
             <a:endParaRPr lang="en-US" dirty="0"/>
           </a:p>
         </p:txBody>
@@ -6778,7 +8133,7 @@
     </p:spTree>
     <p:extLst>
       <p:ext uri="{BB962C8B-B14F-4D97-AF65-F5344CB8AC3E}">
-        <p14:creationId xmlns:p14="http://schemas.microsoft.com/office/powerpoint/2010/main" xmlns="" val="3769006437"/>
+        <p14:creationId xmlns:p14="http://schemas.microsoft.com/office/powerpoint/2010/main" val="3067977362"/>
       </p:ext>
     </p:extLst>
   </p:cSld>
@@ -6860,8 +8215,11 @@
           </a:p>
           <a:p>
             <a:pPr lvl="1">
-              <a:buFont typeface="Arial" panose="020B0604020202020204" pitchFamily="34" charset="0"/>
-              <a:buChar char="•"/>
+              <a:buClr>
+                <a:srgbClr val="FF0000"/>
+              </a:buClr>
+              <a:buFont typeface="Wingdings" panose="05000000000000000000" pitchFamily="2" charset="2"/>
+              <a:buChar char="q"/>
             </a:pPr>
             <a:r>
               <a:rPr lang="en-US" dirty="0" smtClean="0"/>
@@ -6870,8 +8228,11 @@
           </a:p>
           <a:p>
             <a:pPr lvl="1">
-              <a:buFont typeface="Arial" panose="020B0604020202020204" pitchFamily="34" charset="0"/>
-              <a:buChar char="•"/>
+              <a:buClr>
+                <a:srgbClr val="FF0000"/>
+              </a:buClr>
+              <a:buFont typeface="Wingdings" panose="05000000000000000000" pitchFamily="2" charset="2"/>
+              <a:buChar char="q"/>
             </a:pPr>
             <a:r>
               <a:rPr lang="en-US" dirty="0" smtClean="0"/>
@@ -6880,8 +8241,11 @@
           </a:p>
           <a:p>
             <a:pPr lvl="1">
-              <a:buFont typeface="Arial" panose="020B0604020202020204" pitchFamily="34" charset="0"/>
-              <a:buChar char="•"/>
+              <a:buClr>
+                <a:srgbClr val="FF0000"/>
+              </a:buClr>
+              <a:buFont typeface="Wingdings" panose="05000000000000000000" pitchFamily="2" charset="2"/>
+              <a:buChar char="q"/>
             </a:pPr>
             <a:r>
               <a:rPr lang="en-US" dirty="0" smtClean="0"/>
@@ -6890,8 +8254,11 @@
           </a:p>
           <a:p>
             <a:pPr lvl="1">
-              <a:buFont typeface="Arial" panose="020B0604020202020204" pitchFamily="34" charset="0"/>
-              <a:buChar char="•"/>
+              <a:buClr>
+                <a:srgbClr val="FF0000"/>
+              </a:buClr>
+              <a:buFont typeface="Wingdings" panose="05000000000000000000" pitchFamily="2" charset="2"/>
+              <a:buChar char="q"/>
             </a:pPr>
             <a:r>
               <a:rPr lang="en-US" dirty="0" smtClean="0"/>
@@ -6958,7 +8325,7 @@
     </p:spTree>
     <p:extLst>
       <p:ext uri="{BB962C8B-B14F-4D97-AF65-F5344CB8AC3E}">
-        <p14:creationId xmlns:p14="http://schemas.microsoft.com/office/powerpoint/2010/main" xmlns="" val="3402557777"/>
+        <p14:creationId xmlns:p14="http://schemas.microsoft.com/office/powerpoint/2010/main" val="4280124112"/>
       </p:ext>
     </p:extLst>
   </p:cSld>
@@ -6968,6 +8335,13 @@
   <p:transition>
     <p:fade thruBlk="1"/>
   </p:transition>
+  <p:timing>
+    <p:tnLst>
+      <p:par>
+        <p:cTn id="1" dur="indefinite" restart="never" nodeType="tmRoot"/>
+      </p:par>
+    </p:tnLst>
+  </p:timing>
 </p:sld>
 </file>
 
@@ -7023,7 +8397,9 @@
         </p:nvSpPr>
         <p:spPr/>
         <p:txBody>
-          <a:bodyPr/>
+          <a:bodyPr>
+            <a:normAutofit lnSpcReduction="10000"/>
+          </a:bodyPr>
           <a:lstStyle/>
           <a:p>
             <a:r>
@@ -7037,8 +8413,11 @@
           </a:p>
           <a:p>
             <a:pPr lvl="1">
-              <a:buFont typeface="Arial" panose="020B0604020202020204" pitchFamily="34" charset="0"/>
-              <a:buChar char="•"/>
+              <a:buClr>
+                <a:srgbClr val="FF0000"/>
+              </a:buClr>
+              <a:buFont typeface="Wingdings" panose="05000000000000000000" pitchFamily="2" charset="2"/>
+              <a:buChar char="q"/>
             </a:pPr>
             <a:r>
               <a:rPr lang="en-US" dirty="0" smtClean="0"/>
@@ -7047,8 +8426,11 @@
           </a:p>
           <a:p>
             <a:pPr lvl="1">
-              <a:buFont typeface="Arial" panose="020B0604020202020204" pitchFamily="34" charset="0"/>
-              <a:buChar char="•"/>
+              <a:buClr>
+                <a:srgbClr val="FF0000"/>
+              </a:buClr>
+              <a:buFont typeface="Wingdings" panose="05000000000000000000" pitchFamily="2" charset="2"/>
+              <a:buChar char="q"/>
             </a:pPr>
             <a:r>
               <a:rPr lang="en-US" dirty="0" smtClean="0"/>
@@ -7057,8 +8439,11 @@
           </a:p>
           <a:p>
             <a:pPr lvl="1">
-              <a:buFont typeface="Arial" panose="020B0604020202020204" pitchFamily="34" charset="0"/>
-              <a:buChar char="•"/>
+              <a:buClr>
+                <a:srgbClr val="FF0000"/>
+              </a:buClr>
+              <a:buFont typeface="Wingdings" panose="05000000000000000000" pitchFamily="2" charset="2"/>
+              <a:buChar char="q"/>
             </a:pPr>
             <a:r>
               <a:rPr lang="en-US" dirty="0"/>
@@ -7067,8 +8452,11 @@
           </a:p>
           <a:p>
             <a:pPr lvl="1">
-              <a:buFont typeface="Arial" panose="020B0604020202020204" pitchFamily="34" charset="0"/>
-              <a:buChar char="•"/>
+              <a:buClr>
+                <a:srgbClr val="FF0000"/>
+              </a:buClr>
+              <a:buFont typeface="Wingdings" panose="05000000000000000000" pitchFamily="2" charset="2"/>
+              <a:buChar char="q"/>
             </a:pPr>
             <a:r>
               <a:rPr lang="en-US" dirty="0" smtClean="0"/>
@@ -7077,8 +8465,11 @@
           </a:p>
           <a:p>
             <a:pPr lvl="1">
-              <a:buFont typeface="Arial" panose="020B0604020202020204" pitchFamily="34" charset="0"/>
-              <a:buChar char="•"/>
+              <a:buClr>
+                <a:srgbClr val="FF0000"/>
+              </a:buClr>
+              <a:buFont typeface="Wingdings" panose="05000000000000000000" pitchFamily="2" charset="2"/>
+              <a:buChar char="q"/>
             </a:pPr>
             <a:r>
               <a:rPr lang="en-US" dirty="0"/>
@@ -7091,8 +8482,11 @@
           </a:p>
           <a:p>
             <a:pPr lvl="1">
-              <a:buFont typeface="Arial" panose="020B0604020202020204" pitchFamily="34" charset="0"/>
-              <a:buChar char="•"/>
+              <a:buClr>
+                <a:srgbClr val="FF0000"/>
+              </a:buClr>
+              <a:buFont typeface="Wingdings" panose="05000000000000000000" pitchFamily="2" charset="2"/>
+              <a:buChar char="q"/>
             </a:pPr>
             <a:r>
               <a:rPr lang="en-US" dirty="0" smtClean="0"/>
@@ -7101,8 +8495,11 @@
           </a:p>
           <a:p>
             <a:pPr lvl="1">
-              <a:buFont typeface="Arial" panose="020B0604020202020204" pitchFamily="34" charset="0"/>
-              <a:buChar char="•"/>
+              <a:buClr>
+                <a:srgbClr val="FF0000"/>
+              </a:buClr>
+              <a:buFont typeface="Wingdings" panose="05000000000000000000" pitchFamily="2" charset="2"/>
+              <a:buChar char="q"/>
             </a:pPr>
             <a:endParaRPr lang="en-US" dirty="0" smtClean="0"/>
           </a:p>
@@ -7154,7 +8551,7 @@
     </p:spTree>
     <p:extLst>
       <p:ext uri="{BB962C8B-B14F-4D97-AF65-F5344CB8AC3E}">
-        <p14:creationId xmlns:p14="http://schemas.microsoft.com/office/powerpoint/2010/main" xmlns="" val="2660979623"/>
+        <p14:creationId xmlns:p14="http://schemas.microsoft.com/office/powerpoint/2010/main" val="622297160"/>
       </p:ext>
     </p:extLst>
   </p:cSld>
@@ -7164,6 +8561,13 @@
   <p:transition>
     <p:fade thruBlk="1"/>
   </p:transition>
+  <p:timing>
+    <p:tnLst>
+      <p:par>
+        <p:cTn id="1" dur="indefinite" restart="never" nodeType="tmRoot"/>
+      </p:par>
+    </p:tnLst>
+  </p:timing>
 </p:sld>
 </file>
 
@@ -7229,15 +8633,7 @@
             </a:pPr>
             <a:r>
               <a:rPr lang="en-US" dirty="0" smtClean="0"/>
-              <a:t>100</a:t>
-            </a:r>
-            <a:r>
-              <a:rPr lang="en-US" dirty="0" smtClean="0"/>
-              <a:t>% </a:t>
-            </a:r>
-            <a:r>
-              <a:rPr lang="en-US" dirty="0" smtClean="0"/>
-              <a:t>Pass rate on unit testing</a:t>
+              <a:t>--% Pass rate on unit testing</a:t>
             </a:r>
           </a:p>
           <a:p>
@@ -7248,15 +8644,7 @@
             </a:pPr>
             <a:r>
               <a:rPr lang="en-US" dirty="0" smtClean="0"/>
-              <a:t>100</a:t>
-            </a:r>
-            <a:r>
-              <a:rPr lang="en-US" dirty="0" smtClean="0"/>
-              <a:t>% </a:t>
-            </a:r>
-            <a:r>
-              <a:rPr lang="en-US" dirty="0" smtClean="0"/>
-              <a:t>Pass rate on acceptance testing</a:t>
+              <a:t>--% Pass rate on acceptance testing</a:t>
             </a:r>
           </a:p>
           <a:p>
@@ -7266,16 +8654,8 @@
               </a:lnSpc>
             </a:pPr>
             <a:r>
-              <a:rPr lang="en-US" smtClean="0"/>
-              <a:t>98</a:t>
-            </a:r>
-            <a:r>
-              <a:rPr lang="en-US" smtClean="0"/>
-              <a:t>% </a:t>
-            </a:r>
-            <a:r>
-              <a:rPr lang="en-US" dirty="0" smtClean="0"/>
-              <a:t>Code coverage</a:t>
+              <a:rPr lang="en-US" dirty="0" smtClean="0"/>
+              <a:t>--% Code coverage</a:t>
             </a:r>
             <a:endParaRPr lang="en-US" dirty="0"/>
           </a:p>
@@ -7327,7 +8707,7 @@
     </p:spTree>
     <p:extLst>
       <p:ext uri="{BB962C8B-B14F-4D97-AF65-F5344CB8AC3E}">
-        <p14:creationId xmlns:p14="http://schemas.microsoft.com/office/powerpoint/2010/main" xmlns="" val="242575127"/>
+        <p14:creationId xmlns:p14="http://schemas.microsoft.com/office/powerpoint/2010/main" val="3961191943"/>
       </p:ext>
     </p:extLst>
   </p:cSld>
@@ -7379,26 +8759,11 @@
           <a:bodyPr/>
           <a:lstStyle/>
           <a:p>
-            <a:endParaRPr lang="en-US"/>
-          </a:p>
-        </p:txBody>
-      </p:sp>
-      <p:sp>
-        <p:nvSpPr>
-          <p:cNvPr id="3" name="Content Placeholder 2"/>
-          <p:cNvSpPr>
-            <a:spLocks noGrp="1"/>
-          </p:cNvSpPr>
-          <p:nvPr>
-            <p:ph idx="1"/>
-          </p:nvPr>
-        </p:nvSpPr>
-        <p:spPr/>
-        <p:txBody>
-          <a:bodyPr/>
-          <a:lstStyle/>
-          <a:p>
-            <a:endParaRPr lang="en-US"/>
+            <a:r>
+              <a:rPr lang="en-US" dirty="0" smtClean="0"/>
+              <a:t>Class Diagram</a:t>
+            </a:r>
+            <a:endParaRPr lang="en-US" dirty="0"/>
           </a:p>
         </p:txBody>
       </p:sp>
@@ -7445,10 +8810,39 @@
           </a:p>
         </p:txBody>
       </p:sp>
+      <p:pic>
+        <p:nvPicPr>
+          <p:cNvPr id="9" name="Content Placeholder 8"/>
+          <p:cNvPicPr>
+            <a:picLocks noGrp="1" noChangeAspect="1"/>
+          </p:cNvPicPr>
+          <p:nvPr>
+            <p:ph idx="1"/>
+          </p:nvPr>
+        </p:nvPicPr>
+        <p:blipFill>
+          <a:blip r:embed="rId2" cstate="print">
+            <a:extLst>
+              <a:ext uri="{28A0092B-C50C-407E-A947-70E740481C1C}">
+                <a14:useLocalDpi xmlns:a14="http://schemas.microsoft.com/office/drawing/2010/main" val="0"/>
+              </a:ext>
+            </a:extLst>
+          </a:blip>
+          <a:stretch>
+            <a:fillRect/>
+          </a:stretch>
+        </p:blipFill>
+        <p:spPr>
+          <a:xfrm>
+            <a:off x="457200" y="1828800"/>
+            <a:ext cx="8229600" cy="4527550"/>
+          </a:xfrm>
+        </p:spPr>
+      </p:pic>
     </p:spTree>
     <p:extLst>
       <p:ext uri="{BB962C8B-B14F-4D97-AF65-F5344CB8AC3E}">
-        <p14:creationId xmlns:p14="http://schemas.microsoft.com/office/powerpoint/2010/main" xmlns="" val="1143768523"/>
+        <p14:creationId xmlns:p14="http://schemas.microsoft.com/office/powerpoint/2010/main" val="4231651364"/>
       </p:ext>
     </p:extLst>
   </p:cSld>
@@ -7458,6 +8852,13 @@
   <p:transition>
     <p:fade thruBlk="1"/>
   </p:transition>
+  <p:timing>
+    <p:tnLst>
+      <p:par>
+        <p:cTn id="1" dur="indefinite" restart="never" nodeType="tmRoot"/>
+      </p:par>
+    </p:tnLst>
+  </p:timing>
 </p:sld>
 </file>
 
@@ -7495,7 +8896,7 @@
           <a:p>
             <a:r>
               <a:rPr lang="en-US" dirty="0" smtClean="0"/>
-              <a:t>Writing Arguments</a:t>
+              <a:t>Class Diagram</a:t>
             </a:r>
             <a:endParaRPr lang="en-US" dirty="0"/>
           </a:p>
@@ -7525,43 +8926,457 @@
           </a:p>
         </p:txBody>
       </p:sp>
+      <p:sp>
+        <p:nvSpPr>
+          <p:cNvPr id="5" name="Footer Placeholder 4"/>
+          <p:cNvSpPr>
+            <a:spLocks noGrp="1"/>
+          </p:cNvSpPr>
+          <p:nvPr>
+            <p:ph type="ftr" sz="quarter" idx="12"/>
+          </p:nvPr>
+        </p:nvSpPr>
+        <p:spPr/>
+        <p:txBody>
+          <a:bodyPr/>
+          <a:lstStyle/>
+          <a:p>
+            <a:endParaRPr lang="en-US" dirty="0"/>
+          </a:p>
+        </p:txBody>
+      </p:sp>
       <p:pic>
         <p:nvPicPr>
-          <p:cNvPr id="1026" name="Picture 2"/>
+          <p:cNvPr id="9" name="Content Placeholder 8"/>
           <p:cNvPicPr>
-            <a:picLocks noChangeAspect="1" noChangeArrowheads="1"/>
+            <a:picLocks noGrp="1" noChangeAspect="1"/>
           </p:cNvPicPr>
-          <p:nvPr/>
+          <p:nvPr>
+            <p:ph idx="1"/>
+          </p:nvPr>
         </p:nvPicPr>
         <p:blipFill>
-          <a:blip r:embed="rId2"/>
-          <a:srcRect/>
+          <a:blip r:embed="rId2" cstate="print">
+            <a:extLst>
+              <a:ext uri="{28A0092B-C50C-407E-A947-70E740481C1C}">
+                <a14:useLocalDpi xmlns:a14="http://schemas.microsoft.com/office/drawing/2010/main" val="0"/>
+              </a:ext>
+            </a:extLst>
+          </a:blip>
           <a:stretch>
             <a:fillRect/>
           </a:stretch>
         </p:blipFill>
-        <p:spPr bwMode="auto">
+        <p:spPr>
           <a:xfrm>
-            <a:off x="228600" y="1828800"/>
-            <a:ext cx="8915400" cy="4371975"/>
+            <a:off x="457200" y="1828800"/>
+            <a:ext cx="8229600" cy="4527550"/>
+          </a:xfrm>
+        </p:spPr>
+      </p:pic>
+      <p:sp>
+        <p:nvSpPr>
+          <p:cNvPr id="3" name="Rectangle 2"/>
+          <p:cNvSpPr/>
+          <p:nvPr/>
+        </p:nvSpPr>
+        <p:spPr>
+          <a:xfrm>
+            <a:off x="457200" y="1816100"/>
+            <a:ext cx="2895600" cy="317500"/>
           </a:xfrm>
           <a:prstGeom prst="rect">
             <a:avLst/>
           </a:prstGeom>
           <a:noFill/>
-          <a:ln w="9525">
-            <a:noFill/>
-            <a:miter lim="800000"/>
-            <a:headEnd/>
-            <a:tailEnd/>
+        </p:spPr>
+        <p:style>
+          <a:lnRef idx="2">
+            <a:schemeClr val="accent1">
+              <a:shade val="50000"/>
+            </a:schemeClr>
+          </a:lnRef>
+          <a:fillRef idx="1">
+            <a:schemeClr val="accent1"/>
+          </a:fillRef>
+          <a:effectRef idx="0">
+            <a:schemeClr val="accent1"/>
+          </a:effectRef>
+          <a:fontRef idx="minor">
+            <a:schemeClr val="lt1"/>
+          </a:fontRef>
+        </p:style>
+        <p:txBody>
+          <a:bodyPr rtlCol="0" anchor="ctr"/>
+          <a:lstStyle/>
+          <a:p>
+            <a:pPr algn="ctr"/>
+            <a:endParaRPr lang="en-US"/>
+          </a:p>
+        </p:txBody>
+      </p:sp>
+      <p:sp>
+        <p:nvSpPr>
+          <p:cNvPr id="7" name="Rectangle 6"/>
+          <p:cNvSpPr/>
+          <p:nvPr/>
+        </p:nvSpPr>
+        <p:spPr>
+          <a:xfrm>
+            <a:off x="3429000" y="1816100"/>
+            <a:ext cx="2895600" cy="1079500"/>
+          </a:xfrm>
+          <a:prstGeom prst="rect">
+            <a:avLst/>
+          </a:prstGeom>
+          <a:noFill/>
+          <a:ln>
+            <a:solidFill>
+              <a:srgbClr val="00B050"/>
+            </a:solidFill>
           </a:ln>
-          <a:effectLst/>
         </p:spPr>
-      </p:pic>
+        <p:style>
+          <a:lnRef idx="2">
+            <a:schemeClr val="accent1">
+              <a:shade val="50000"/>
+            </a:schemeClr>
+          </a:lnRef>
+          <a:fillRef idx="1">
+            <a:schemeClr val="accent1"/>
+          </a:fillRef>
+          <a:effectRef idx="0">
+            <a:schemeClr val="accent1"/>
+          </a:effectRef>
+          <a:fontRef idx="minor">
+            <a:schemeClr val="lt1"/>
+          </a:fontRef>
+        </p:style>
+        <p:txBody>
+          <a:bodyPr rtlCol="0" anchor="ctr"/>
+          <a:lstStyle/>
+          <a:p>
+            <a:pPr algn="ctr"/>
+            <a:endParaRPr lang="en-US"/>
+          </a:p>
+        </p:txBody>
+      </p:sp>
+      <p:sp>
+        <p:nvSpPr>
+          <p:cNvPr id="8" name="Rectangle 7"/>
+          <p:cNvSpPr/>
+          <p:nvPr/>
+        </p:nvSpPr>
+        <p:spPr>
+          <a:xfrm>
+            <a:off x="6388100" y="1816100"/>
+            <a:ext cx="2374900" cy="2298700"/>
+          </a:xfrm>
+          <a:prstGeom prst="rect">
+            <a:avLst/>
+          </a:prstGeom>
+          <a:noFill/>
+          <a:ln>
+            <a:solidFill>
+              <a:srgbClr val="00B0F0"/>
+            </a:solidFill>
+          </a:ln>
+        </p:spPr>
+        <p:style>
+          <a:lnRef idx="2">
+            <a:schemeClr val="accent1">
+              <a:shade val="50000"/>
+            </a:schemeClr>
+          </a:lnRef>
+          <a:fillRef idx="1">
+            <a:schemeClr val="accent1"/>
+          </a:fillRef>
+          <a:effectRef idx="0">
+            <a:schemeClr val="accent1"/>
+          </a:effectRef>
+          <a:fontRef idx="minor">
+            <a:schemeClr val="lt1"/>
+          </a:fontRef>
+        </p:style>
+        <p:txBody>
+          <a:bodyPr rtlCol="0" anchor="ctr"/>
+          <a:lstStyle/>
+          <a:p>
+            <a:pPr algn="ctr"/>
+            <a:endParaRPr lang="en-US"/>
+          </a:p>
+        </p:txBody>
+      </p:sp>
+      <p:sp>
+        <p:nvSpPr>
+          <p:cNvPr id="10" name="Rectangle 9"/>
+          <p:cNvSpPr/>
+          <p:nvPr/>
+        </p:nvSpPr>
+        <p:spPr>
+          <a:xfrm>
+            <a:off x="6019800" y="4127499"/>
+            <a:ext cx="1447800" cy="2263775"/>
+          </a:xfrm>
+          <a:prstGeom prst="rect">
+            <a:avLst/>
+          </a:prstGeom>
+          <a:noFill/>
+          <a:ln>
+            <a:solidFill>
+              <a:srgbClr val="7030A0"/>
+            </a:solidFill>
+          </a:ln>
+        </p:spPr>
+        <p:style>
+          <a:lnRef idx="2">
+            <a:schemeClr val="accent1">
+              <a:shade val="50000"/>
+            </a:schemeClr>
+          </a:lnRef>
+          <a:fillRef idx="1">
+            <a:schemeClr val="accent1"/>
+          </a:fillRef>
+          <a:effectRef idx="0">
+            <a:schemeClr val="accent1"/>
+          </a:effectRef>
+          <a:fontRef idx="minor">
+            <a:schemeClr val="lt1"/>
+          </a:fontRef>
+        </p:style>
+        <p:txBody>
+          <a:bodyPr rtlCol="0" anchor="ctr"/>
+          <a:lstStyle/>
+          <a:p>
+            <a:pPr algn="ctr"/>
+            <a:endParaRPr lang="en-US"/>
+          </a:p>
+        </p:txBody>
+      </p:sp>
+      <p:sp>
+        <p:nvSpPr>
+          <p:cNvPr id="6" name="Rectangle 5"/>
+          <p:cNvSpPr/>
+          <p:nvPr/>
+        </p:nvSpPr>
+        <p:spPr>
+          <a:xfrm>
+            <a:off x="762000" y="2190313"/>
+            <a:ext cx="2362200" cy="923330"/>
+          </a:xfrm>
+          <a:prstGeom prst="rect">
+            <a:avLst/>
+          </a:prstGeom>
+          <a:noFill/>
+        </p:spPr>
+        <p:txBody>
+          <a:bodyPr wrap="square" lIns="91440" tIns="45720" rIns="91440" bIns="45720">
+            <a:spAutoFit/>
+          </a:bodyPr>
+          <a:lstStyle/>
+          <a:p>
+            <a:pPr algn="ctr"/>
+            <a:r>
+              <a:rPr lang="en-US" sz="5400" b="0" cap="none" spc="0" dirty="0" smtClean="0">
+                <a:ln w="0"/>
+                <a:solidFill>
+                  <a:srgbClr val="385D8A"/>
+                </a:solidFill>
+                <a:effectLst>
+                  <a:outerShdw blurRad="38100" dist="19050" dir="2700000" algn="tl" rotWithShape="0">
+                    <a:schemeClr val="dk1">
+                      <a:alpha val="40000"/>
+                    </a:schemeClr>
+                  </a:outerShdw>
+                </a:effectLst>
+              </a:rPr>
+              <a:t>Part A.</a:t>
+            </a:r>
+            <a:endParaRPr lang="en-US" sz="5400" b="0" cap="none" spc="0" dirty="0">
+              <a:ln w="0"/>
+              <a:solidFill>
+                <a:srgbClr val="385D8A"/>
+              </a:solidFill>
+              <a:effectLst>
+                <a:outerShdw blurRad="38100" dist="19050" dir="2700000" algn="tl" rotWithShape="0">
+                  <a:schemeClr val="dk1">
+                    <a:alpha val="40000"/>
+                  </a:schemeClr>
+                </a:outerShdw>
+              </a:effectLst>
+            </a:endParaRPr>
+          </a:p>
+        </p:txBody>
+      </p:sp>
+      <p:sp>
+        <p:nvSpPr>
+          <p:cNvPr id="11" name="Rectangle 10"/>
+          <p:cNvSpPr/>
+          <p:nvPr/>
+        </p:nvSpPr>
+        <p:spPr>
+          <a:xfrm>
+            <a:off x="3695700" y="2859980"/>
+            <a:ext cx="2362200" cy="923330"/>
+          </a:xfrm>
+          <a:prstGeom prst="rect">
+            <a:avLst/>
+          </a:prstGeom>
+          <a:noFill/>
+        </p:spPr>
+        <p:txBody>
+          <a:bodyPr wrap="square" lIns="91440" tIns="45720" rIns="91440" bIns="45720">
+            <a:spAutoFit/>
+          </a:bodyPr>
+          <a:lstStyle/>
+          <a:p>
+            <a:pPr algn="ctr"/>
+            <a:r>
+              <a:rPr lang="en-US" sz="5400" b="0" cap="none" spc="0" dirty="0" smtClean="0">
+                <a:ln w="0"/>
+                <a:solidFill>
+                  <a:srgbClr val="00B050"/>
+                </a:solidFill>
+                <a:effectLst>
+                  <a:outerShdw blurRad="38100" dist="19050" dir="2700000" algn="tl" rotWithShape="0">
+                    <a:schemeClr val="dk1">
+                      <a:alpha val="40000"/>
+                    </a:schemeClr>
+                  </a:outerShdw>
+                </a:effectLst>
+              </a:rPr>
+              <a:t>Part B.</a:t>
+            </a:r>
+            <a:endParaRPr lang="en-US" sz="5400" b="0" cap="none" spc="0" dirty="0">
+              <a:ln w="0"/>
+              <a:solidFill>
+                <a:srgbClr val="00B050"/>
+              </a:solidFill>
+              <a:effectLst>
+                <a:outerShdw blurRad="38100" dist="19050" dir="2700000" algn="tl" rotWithShape="0">
+                  <a:schemeClr val="dk1">
+                    <a:alpha val="40000"/>
+                  </a:schemeClr>
+                </a:outerShdw>
+              </a:effectLst>
+            </a:endParaRPr>
+          </a:p>
+        </p:txBody>
+      </p:sp>
+      <p:sp>
+        <p:nvSpPr>
+          <p:cNvPr id="12" name="Rectangle 11"/>
+          <p:cNvSpPr/>
+          <p:nvPr/>
+        </p:nvSpPr>
+        <p:spPr>
+          <a:xfrm>
+            <a:off x="7366000" y="2240686"/>
+            <a:ext cx="1397000" cy="1754326"/>
+          </a:xfrm>
+          <a:prstGeom prst="rect">
+            <a:avLst/>
+          </a:prstGeom>
+          <a:noFill/>
+        </p:spPr>
+        <p:txBody>
+          <a:bodyPr wrap="square" lIns="91440" tIns="45720" rIns="91440" bIns="45720">
+            <a:spAutoFit/>
+          </a:bodyPr>
+          <a:lstStyle/>
+          <a:p>
+            <a:pPr algn="ctr"/>
+            <a:r>
+              <a:rPr lang="en-US" sz="5400" b="0" cap="none" spc="0" dirty="0" smtClean="0">
+                <a:ln w="0"/>
+                <a:solidFill>
+                  <a:srgbClr val="00B0F0"/>
+                </a:solidFill>
+                <a:effectLst>
+                  <a:outerShdw blurRad="38100" dist="19050" dir="2700000" algn="tl" rotWithShape="0">
+                    <a:schemeClr val="dk1">
+                      <a:alpha val="40000"/>
+                    </a:schemeClr>
+                  </a:outerShdw>
+                </a:effectLst>
+              </a:rPr>
+              <a:t>Part C.</a:t>
+            </a:r>
+            <a:endParaRPr lang="en-US" sz="5400" b="0" cap="none" spc="0" dirty="0">
+              <a:ln w="0"/>
+              <a:solidFill>
+                <a:srgbClr val="00B0F0"/>
+              </a:solidFill>
+              <a:effectLst>
+                <a:outerShdw blurRad="38100" dist="19050" dir="2700000" algn="tl" rotWithShape="0">
+                  <a:schemeClr val="dk1">
+                    <a:alpha val="40000"/>
+                  </a:schemeClr>
+                </a:outerShdw>
+              </a:effectLst>
+            </a:endParaRPr>
+          </a:p>
+        </p:txBody>
+      </p:sp>
+      <p:sp>
+        <p:nvSpPr>
+          <p:cNvPr id="13" name="Rectangle 12"/>
+          <p:cNvSpPr/>
+          <p:nvPr/>
+        </p:nvSpPr>
+        <p:spPr>
+          <a:xfrm>
+            <a:off x="3505200" y="4610645"/>
+            <a:ext cx="2362200" cy="923330"/>
+          </a:xfrm>
+          <a:prstGeom prst="rect">
+            <a:avLst/>
+          </a:prstGeom>
+          <a:noFill/>
+        </p:spPr>
+        <p:txBody>
+          <a:bodyPr wrap="square" lIns="91440" tIns="45720" rIns="91440" bIns="45720">
+            <a:spAutoFit/>
+          </a:bodyPr>
+          <a:lstStyle/>
+          <a:p>
+            <a:pPr algn="ctr"/>
+            <a:r>
+              <a:rPr lang="en-US" sz="5400" b="0" cap="none" spc="0" dirty="0" smtClean="0">
+                <a:ln w="0"/>
+                <a:solidFill>
+                  <a:srgbClr val="7030A0"/>
+                </a:solidFill>
+                <a:effectLst>
+                  <a:outerShdw blurRad="38100" dist="19050" dir="2700000" algn="tl" rotWithShape="0">
+                    <a:schemeClr val="dk1">
+                      <a:alpha val="40000"/>
+                    </a:schemeClr>
+                  </a:outerShdw>
+                </a:effectLst>
+              </a:rPr>
+              <a:t>Part D.</a:t>
+            </a:r>
+            <a:endParaRPr lang="en-US" sz="5400" b="0" cap="none" spc="0" dirty="0">
+              <a:ln w="0"/>
+              <a:solidFill>
+                <a:srgbClr val="7030A0"/>
+              </a:solidFill>
+              <a:effectLst>
+                <a:outerShdw blurRad="38100" dist="19050" dir="2700000" algn="tl" rotWithShape="0">
+                  <a:schemeClr val="dk1">
+                    <a:alpha val="40000"/>
+                  </a:schemeClr>
+                </a:outerShdw>
+              </a:effectLst>
+            </a:endParaRPr>
+          </a:p>
+        </p:txBody>
+      </p:sp>
     </p:spTree>
     <p:extLst>
       <p:ext uri="{BB962C8B-B14F-4D97-AF65-F5344CB8AC3E}">
-        <p14:creationId xmlns:p14="http://schemas.microsoft.com/office/powerpoint/2010/main" xmlns="" val="2815004547"/>
+        <p14:creationId xmlns:p14="http://schemas.microsoft.com/office/powerpoint/2010/main" val="3865166522"/>
       </p:ext>
     </p:extLst>
   </p:cSld>
@@ -7614,62 +9429,12 @@
           <a:lstStyle/>
           <a:p>
             <a:r>
-              <a:rPr lang="en-US" dirty="0" smtClean="0"/>
-              <a:t>Running XML Write Demo</a:t>
-            </a:r>
-            <a:endParaRPr lang="en-US" dirty="0"/>
-          </a:p>
-        </p:txBody>
-      </p:sp>
-      <p:sp>
-        <p:nvSpPr>
-          <p:cNvPr id="3" name="Content Placeholder 2"/>
-          <p:cNvSpPr>
-            <a:spLocks noGrp="1"/>
-          </p:cNvSpPr>
-          <p:nvPr>
-            <p:ph idx="1"/>
-          </p:nvPr>
-        </p:nvSpPr>
-        <p:spPr/>
-        <p:txBody>
-          <a:bodyPr/>
-          <a:lstStyle/>
-          <a:p>
-            <a:pPr>
-              <a:lnSpc>
-                <a:spcPct val="150000"/>
-              </a:lnSpc>
-            </a:pPr>
-            <a:r>
-              <a:rPr lang="en-US" dirty="0" smtClean="0"/>
-              <a:t>Ran with parameters:</a:t>
-            </a:r>
-          </a:p>
-          <a:p>
-            <a:pPr>
-              <a:lnSpc>
-                <a:spcPct val="150000"/>
-              </a:lnSpc>
-            </a:pPr>
-            <a:endParaRPr lang="en-US" dirty="0" smtClean="0"/>
-          </a:p>
-          <a:p>
-            <a:pPr>
-              <a:lnSpc>
-                <a:spcPct val="150000"/>
-              </a:lnSpc>
-            </a:pPr>
-            <a:r>
-              <a:rPr lang="en-US" dirty="0" smtClean="0"/>
-              <a:t>Result:</a:t>
-            </a:r>
-            <a:br>
-              <a:rPr lang="en-US" dirty="0" smtClean="0"/>
-            </a:br>
-            <a:r>
-              <a:rPr lang="en-US" dirty="0" smtClean="0"/>
-              <a:t>	XML File</a:t>
+              <a:rPr lang="en-US" dirty="0"/>
+              <a:t>Class Diagram (Part </a:t>
+            </a:r>
+            <a:r>
+              <a:rPr lang="en-US" dirty="0" smtClean="0"/>
+              <a:t>A)</a:t>
             </a:r>
             <a:endParaRPr lang="en-US" dirty="0"/>
           </a:p>
@@ -7720,41 +9485,36 @@
       </p:sp>
       <p:pic>
         <p:nvPicPr>
-          <p:cNvPr id="6" name="Picture 2"/>
+          <p:cNvPr id="9" name="Content Placeholder 8"/>
           <p:cNvPicPr>
-            <a:picLocks noChangeAspect="1" noChangeArrowheads="1"/>
+            <a:picLocks noGrp="1" noChangeAspect="1"/>
           </p:cNvPicPr>
-          <p:nvPr/>
+          <p:nvPr>
+            <p:ph idx="1"/>
+          </p:nvPr>
         </p:nvPicPr>
-        <p:blipFill>
-          <a:blip r:embed="rId2"/>
-          <a:srcRect t="25397" b="36508"/>
-          <a:stretch>
-            <a:fillRect/>
-          </a:stretch>
+        <p:blipFill rotWithShape="1">
+          <a:blip r:embed="rId2" cstate="print">
+            <a:extLst>
+              <a:ext uri="{28A0092B-C50C-407E-A947-70E740481C1C}">
+                <a14:useLocalDpi xmlns:a14="http://schemas.microsoft.com/office/drawing/2010/main" val="0"/>
+              </a:ext>
+            </a:extLst>
+          </a:blip>
+          <a:srcRect r="64815" b="94951"/>
+          <a:stretch/>
         </p:blipFill>
-        <p:spPr bwMode="auto">
+        <p:spPr>
           <a:xfrm>
-            <a:off x="914400" y="2590800"/>
-            <a:ext cx="7239000" cy="457200"/>
+            <a:off x="457200" y="3200400"/>
+            <a:ext cx="8077200" cy="838201"/>
           </a:xfrm>
-          <a:prstGeom prst="rect">
-            <a:avLst/>
-          </a:prstGeom>
-          <a:noFill/>
-          <a:ln w="9525">
-            <a:noFill/>
-            <a:miter lim="800000"/>
-            <a:headEnd/>
-            <a:tailEnd/>
-          </a:ln>
-          <a:effectLst/>
         </p:spPr>
       </p:pic>
     </p:spTree>
     <p:extLst>
       <p:ext uri="{BB962C8B-B14F-4D97-AF65-F5344CB8AC3E}">
-        <p14:creationId xmlns:p14="http://schemas.microsoft.com/office/powerpoint/2010/main" xmlns="" val="3212058145"/>
+        <p14:creationId xmlns:p14="http://schemas.microsoft.com/office/powerpoint/2010/main" val="67211367"/>
       </p:ext>
     </p:extLst>
   </p:cSld>
@@ -7807,8 +9567,12 @@
           <a:lstStyle/>
           <a:p>
             <a:r>
-              <a:rPr lang="en-US" dirty="0" smtClean="0"/>
-              <a:t>Loading Arguments</a:t>
+              <a:rPr lang="en-US" dirty="0"/>
+              <a:t>Class Diagram (Part </a:t>
+            </a:r>
+            <a:r>
+              <a:rPr lang="en-US" dirty="0" smtClean="0"/>
+              <a:t>B)</a:t>
             </a:r>
             <a:endParaRPr lang="en-US" dirty="0"/>
           </a:p>
@@ -7838,43 +9602,57 @@
           </a:p>
         </p:txBody>
       </p:sp>
+      <p:sp>
+        <p:nvSpPr>
+          <p:cNvPr id="5" name="Footer Placeholder 4"/>
+          <p:cNvSpPr>
+            <a:spLocks noGrp="1"/>
+          </p:cNvSpPr>
+          <p:nvPr>
+            <p:ph type="ftr" sz="quarter" idx="12"/>
+          </p:nvPr>
+        </p:nvSpPr>
+        <p:spPr/>
+        <p:txBody>
+          <a:bodyPr/>
+          <a:lstStyle/>
+          <a:p>
+            <a:endParaRPr lang="en-US" dirty="0"/>
+          </a:p>
+        </p:txBody>
+      </p:sp>
       <p:pic>
         <p:nvPicPr>
-          <p:cNvPr id="3074" name="Picture 2"/>
+          <p:cNvPr id="9" name="Content Placeholder 8"/>
           <p:cNvPicPr>
-            <a:picLocks noChangeAspect="1" noChangeArrowheads="1"/>
+            <a:picLocks noGrp="1" noChangeAspect="1"/>
           </p:cNvPicPr>
-          <p:nvPr/>
+          <p:nvPr>
+            <p:ph idx="1"/>
+          </p:nvPr>
         </p:nvPicPr>
-        <p:blipFill>
-          <a:blip r:embed="rId2"/>
-          <a:srcRect/>
-          <a:stretch>
-            <a:fillRect/>
-          </a:stretch>
+        <p:blipFill rotWithShape="1">
+          <a:blip r:embed="rId2" cstate="print">
+            <a:extLst>
+              <a:ext uri="{28A0092B-C50C-407E-A947-70E740481C1C}">
+                <a14:useLocalDpi xmlns:a14="http://schemas.microsoft.com/office/drawing/2010/main" val="0"/>
+              </a:ext>
+            </a:extLst>
+          </a:blip>
+          <a:srcRect l="36111" r="28704" b="76437"/>
+          <a:stretch/>
         </p:blipFill>
-        <p:spPr bwMode="auto">
+        <p:spPr>
           <a:xfrm>
-            <a:off x="0" y="1981200"/>
-            <a:ext cx="9144000" cy="3505200"/>
+            <a:off x="457200" y="2438400"/>
+            <a:ext cx="8273143" cy="3048000"/>
           </a:xfrm>
-          <a:prstGeom prst="rect">
-            <a:avLst/>
-          </a:prstGeom>
-          <a:noFill/>
-          <a:ln w="9525">
-            <a:noFill/>
-            <a:miter lim="800000"/>
-            <a:headEnd/>
-            <a:tailEnd/>
-          </a:ln>
-          <a:effectLst/>
         </p:spPr>
       </p:pic>
     </p:spTree>
     <p:extLst>
       <p:ext uri="{BB962C8B-B14F-4D97-AF65-F5344CB8AC3E}">
-        <p14:creationId xmlns:p14="http://schemas.microsoft.com/office/powerpoint/2010/main" xmlns="" val="44792533"/>
+        <p14:creationId xmlns:p14="http://schemas.microsoft.com/office/powerpoint/2010/main" val="160793161"/>
       </p:ext>
     </p:extLst>
   </p:cSld>

</xml_diff>